<commit_message>
Fixed typos, added more notes, added PDF
</commit_message>
<xml_diff>
--- a/Rediscovering Delphi.pptx
+++ b/Rediscovering Delphi.pptx
@@ -186,12 +186,12 @@
   <pc:docChgLst>
     <pc:chgData name="Asbjørn Heid" userId="2ebb1e453379bdcd" providerId="LiveId" clId="{BF04FEC1-31EF-4AF0-817C-FE2CD974B477}"/>
     <pc:docChg chg="undo custSel addSld modSld">
-      <pc:chgData name="Asbjørn Heid" userId="2ebb1e453379bdcd" providerId="LiveId" clId="{BF04FEC1-31EF-4AF0-817C-FE2CD974B477}" dt="2017-11-09T19:54:24.390" v="661" actId="20577"/>
+      <pc:chgData name="Asbjørn Heid" userId="2ebb1e453379bdcd" providerId="LiveId" clId="{BF04FEC1-31EF-4AF0-817C-FE2CD974B477}" dt="2017-11-09T20:33:57.825" v="1667" actId="20577"/>
       <pc:docMkLst>
         <pc:docMk/>
       </pc:docMkLst>
-      <pc:sldChg chg="modSp">
-        <pc:chgData name="Asbjørn Heid" userId="2ebb1e453379bdcd" providerId="LiveId" clId="{BF04FEC1-31EF-4AF0-817C-FE2CD974B477}" dt="2017-11-09T19:19:12.900" v="238" actId="20577"/>
+      <pc:sldChg chg="modSp modNotesTx">
+        <pc:chgData name="Asbjørn Heid" userId="2ebb1e453379bdcd" providerId="LiveId" clId="{BF04FEC1-31EF-4AF0-817C-FE2CD974B477}" dt="2017-11-09T20:25:58.680" v="778" actId="20577"/>
         <pc:sldMkLst>
           <pc:docMk/>
           <pc:sldMk cId="4111838879" sldId="257"/>
@@ -206,14 +206,21 @@
         </pc:spChg>
       </pc:sldChg>
       <pc:sldChg chg="modNotesTx">
-        <pc:chgData name="Asbjørn Heid" userId="2ebb1e453379bdcd" providerId="LiveId" clId="{BF04FEC1-31EF-4AF0-817C-FE2CD974B477}" dt="2017-11-09T19:18:47.753" v="196" actId="20577"/>
+        <pc:chgData name="Asbjørn Heid" userId="2ebb1e453379bdcd" providerId="LiveId" clId="{BF04FEC1-31EF-4AF0-817C-FE2CD974B477}" dt="2017-11-09T20:33:57.825" v="1667" actId="20577"/>
         <pc:sldMkLst>
           <pc:docMk/>
           <pc:sldMk cId="2300019423" sldId="265"/>
         </pc:sldMkLst>
       </pc:sldChg>
       <pc:sldChg chg="modNotesTx">
-        <pc:chgData name="Asbjørn Heid" userId="2ebb1e453379bdcd" providerId="LiveId" clId="{BF04FEC1-31EF-4AF0-817C-FE2CD974B477}" dt="2017-11-09T19:41:42.154" v="336" actId="20577"/>
+        <pc:chgData name="Asbjørn Heid" userId="2ebb1e453379bdcd" providerId="LiveId" clId="{BF04FEC1-31EF-4AF0-817C-FE2CD974B477}" dt="2017-11-09T20:26:39.411" v="803" actId="20577"/>
+        <pc:sldMkLst>
+          <pc:docMk/>
+          <pc:sldMk cId="3737657784" sldId="267"/>
+        </pc:sldMkLst>
+      </pc:sldChg>
+      <pc:sldChg chg="modNotesTx">
+        <pc:chgData name="Asbjørn Heid" userId="2ebb1e453379bdcd" providerId="LiveId" clId="{BF04FEC1-31EF-4AF0-817C-FE2CD974B477}" dt="2017-11-09T20:28:12.328" v="883" actId="20577"/>
         <pc:sldMkLst>
           <pc:docMk/>
           <pc:sldMk cId="4084105794" sldId="278"/>
@@ -226,8 +233,8 @@
           <pc:sldMk cId="1095182993" sldId="279"/>
         </pc:sldMkLst>
       </pc:sldChg>
-      <pc:sldChg chg="modSp">
-        <pc:chgData name="Asbjørn Heid" userId="2ebb1e453379bdcd" providerId="LiveId" clId="{BF04FEC1-31EF-4AF0-817C-FE2CD974B477}" dt="2017-11-09T19:19:09.127" v="232" actId="20577"/>
+      <pc:sldChg chg="modSp modNotesTx">
+        <pc:chgData name="Asbjørn Heid" userId="2ebb1e453379bdcd" providerId="LiveId" clId="{BF04FEC1-31EF-4AF0-817C-FE2CD974B477}" dt="2017-11-09T20:25:47.005" v="767" actId="20577"/>
         <pc:sldMkLst>
           <pc:docMk/>
           <pc:sldMk cId="543790820" sldId="287"/>
@@ -242,7 +249,7 @@
         </pc:spChg>
       </pc:sldChg>
       <pc:sldChg chg="modNotesTx">
-        <pc:chgData name="Asbjørn Heid" userId="2ebb1e453379bdcd" providerId="LiveId" clId="{BF04FEC1-31EF-4AF0-817C-FE2CD974B477}" dt="2017-11-09T19:42:13.746" v="409" actId="20577"/>
+        <pc:chgData name="Asbjørn Heid" userId="2ebb1e453379bdcd" providerId="LiveId" clId="{BF04FEC1-31EF-4AF0-817C-FE2CD974B477}" dt="2017-11-09T20:27:53.059" v="833" actId="20577"/>
         <pc:sldMkLst>
           <pc:docMk/>
           <pc:sldMk cId="2540353576" sldId="288"/>
@@ -263,11 +270,40 @@
           </ac:spMkLst>
         </pc:spChg>
       </pc:sldChg>
+      <pc:sldChg chg="modSp">
+        <pc:chgData name="Asbjørn Heid" userId="2ebb1e453379bdcd" providerId="LiveId" clId="{BF04FEC1-31EF-4AF0-817C-FE2CD974B477}" dt="2017-11-09T20:28:51.615" v="886" actId="403"/>
+        <pc:sldMkLst>
+          <pc:docMk/>
+          <pc:sldMk cId="3814745801" sldId="299"/>
+        </pc:sldMkLst>
+        <pc:spChg chg="mod">
+          <ac:chgData name="Asbjørn Heid" userId="2ebb1e453379bdcd" providerId="LiveId" clId="{BF04FEC1-31EF-4AF0-817C-FE2CD974B477}" dt="2017-11-09T20:28:51.615" v="886" actId="403"/>
+          <ac:spMkLst>
+            <pc:docMk/>
+            <pc:sldMk cId="3814745801" sldId="299"/>
+            <ac:spMk id="3" creationId="{A11894FC-AB79-482F-8787-0D821EBECDBE}"/>
+          </ac:spMkLst>
+        </pc:spChg>
+      </pc:sldChg>
       <pc:sldChg chg="modNotesTx">
-        <pc:chgData name="Asbjørn Heid" userId="2ebb1e453379bdcd" providerId="LiveId" clId="{BF04FEC1-31EF-4AF0-817C-FE2CD974B477}" dt="2017-11-09T19:54:24.390" v="661" actId="20577"/>
+        <pc:chgData name="Asbjørn Heid" userId="2ebb1e453379bdcd" providerId="LiveId" clId="{BF04FEC1-31EF-4AF0-817C-FE2CD974B477}" dt="2017-11-09T20:30:28.107" v="1212" actId="20577"/>
+        <pc:sldMkLst>
+          <pc:docMk/>
+          <pc:sldMk cId="1772024841" sldId="302"/>
+        </pc:sldMkLst>
+      </pc:sldChg>
+      <pc:sldChg chg="modNotesTx">
+        <pc:chgData name="Asbjørn Heid" userId="2ebb1e453379bdcd" providerId="LiveId" clId="{BF04FEC1-31EF-4AF0-817C-FE2CD974B477}" dt="2017-11-09T20:30:42.045" v="1216" actId="20577"/>
         <pc:sldMkLst>
           <pc:docMk/>
           <pc:sldMk cId="1345377341" sldId="304"/>
+        </pc:sldMkLst>
+      </pc:sldChg>
+      <pc:sldChg chg="modNotesTx">
+        <pc:chgData name="Asbjørn Heid" userId="2ebb1e453379bdcd" providerId="LiveId" clId="{BF04FEC1-31EF-4AF0-817C-FE2CD974B477}" dt="2017-11-09T20:32:33.576" v="1666" actId="20577"/>
+        <pc:sldMkLst>
+          <pc:docMk/>
+          <pc:sldMk cId="3845087460" sldId="308"/>
         </pc:sldMkLst>
       </pc:sldChg>
       <pc:sldChg chg="modSp add">
@@ -824,19 +860,19 @@
           </ac:spMkLst>
         </pc:spChg>
         <pc:spChg chg="add del mod">
+          <ac:chgData name="Asbjørn Heid" userId="2ebb1e453379bdcd" providerId="LiveId" clId="{DC7B84AC-2463-418A-8846-1ACCA37EA798}" dt="2017-09-23T23:11:06.043" v="5320" actId="478"/>
+          <ac:spMkLst>
+            <pc:docMk/>
+            <pc:sldMk cId="554096210" sldId="269"/>
+            <ac:spMk id="6" creationId="{86BC978D-3245-4967-B0C8-32303D992520}"/>
+          </ac:spMkLst>
+        </pc:spChg>
+        <pc:spChg chg="add del mod">
           <ac:chgData name="Asbjørn Heid" userId="2ebb1e453379bdcd" providerId="LiveId" clId="{DC7B84AC-2463-418A-8846-1ACCA37EA798}" dt="2017-09-29T20:20:21.025" v="11466" actId="478"/>
           <ac:spMkLst>
             <pc:docMk/>
             <pc:sldMk cId="554096210" sldId="269"/>
             <ac:spMk id="6" creationId="{4ACEBCD1-FE38-42F9-AAA1-569DC1029CED}"/>
-          </ac:spMkLst>
-        </pc:spChg>
-        <pc:spChg chg="add del mod">
-          <ac:chgData name="Asbjørn Heid" userId="2ebb1e453379bdcd" providerId="LiveId" clId="{DC7B84AC-2463-418A-8846-1ACCA37EA798}" dt="2017-09-23T23:11:06.043" v="5320" actId="478"/>
-          <ac:spMkLst>
-            <pc:docMk/>
-            <pc:sldMk cId="554096210" sldId="269"/>
-            <ac:spMk id="6" creationId="{86BC978D-3245-4967-B0C8-32303D992520}"/>
           </ac:spMkLst>
         </pc:spChg>
         <pc:spChg chg="add mod">
@@ -1872,64 +1908,7 @@
           <a:bodyPr/>
           <a:lstStyle/>
           <a:p>
-            <a:r>
-              <a:rPr lang="en-US" dirty="0">
-                <a:latin typeface="+mn-lt"/>
-              </a:rPr>
-              <a:t>The overloaded Invoke in </a:t>
-            </a:r>
-            <a:r>
-              <a:rPr lang="en-US" dirty="0" err="1">
-                <a:latin typeface="+mn-lt"/>
-                <a:cs typeface="Consolas" panose="020B0609020204030204" pitchFamily="49" charset="0"/>
-              </a:rPr>
-              <a:t>IIntegerObj</a:t>
-            </a:r>
-            <a:r>
-              <a:rPr lang="en-US" dirty="0">
-                <a:latin typeface="+mn-lt"/>
-              </a:rPr>
-              <a:t> has similar definition to what one would expect </a:t>
-            </a:r>
-            <a:r>
-              <a:rPr lang="en-US" dirty="0" err="1">
-                <a:latin typeface="+mn-lt"/>
-              </a:rPr>
-              <a:t>TIntegerProc</a:t>
-            </a:r>
-            <a:r>
-              <a:rPr lang="en-US" dirty="0">
-                <a:latin typeface="+mn-lt"/>
-              </a:rPr>
-              <a:t> to have, i.e. </a:t>
-            </a:r>
-            <a:r>
-              <a:rPr lang="en-US" dirty="0" err="1">
-                <a:latin typeface="+mn-lt"/>
-              </a:rPr>
-              <a:t>TIntegerProc</a:t>
-            </a:r>
-            <a:r>
-              <a:rPr lang="en-US" dirty="0">
-                <a:latin typeface="+mn-lt"/>
-              </a:rPr>
-              <a:t> = reference to procedure(</a:t>
-            </a:r>
-            <a:r>
-              <a:rPr lang="en-US" dirty="0" err="1">
-                <a:latin typeface="+mn-lt"/>
-              </a:rPr>
-              <a:t>const</a:t>
-            </a:r>
-            <a:r>
-              <a:rPr lang="en-US" dirty="0">
-                <a:latin typeface="+mn-lt"/>
-              </a:rPr>
-              <a:t> Value: integer);</a:t>
-            </a:r>
-            <a:endParaRPr lang="nb-NO" dirty="0">
-              <a:latin typeface="+mn-lt"/>
-            </a:endParaRPr>
+            <a:endParaRPr lang="nb-NO"/>
           </a:p>
         </p:txBody>
       </p:sp>
@@ -1950,7 +1929,7 @@
           <a:p>
             <a:fld id="{5DB155C7-787B-4005-9B48-59EDEA8A8FE0}" type="slidenum">
               <a:rPr lang="nb-NO" smtClean="0"/>
-              <a:t>13</a:t>
+              <a:t>10</a:t>
             </a:fld>
             <a:endParaRPr lang="nb-NO"/>
           </a:p>
@@ -1959,7 +1938,7 @@
     </p:spTree>
     <p:extLst>
       <p:ext uri="{BB962C8B-B14F-4D97-AF65-F5344CB8AC3E}">
-        <p14:creationId xmlns:p14="http://schemas.microsoft.com/office/powerpoint/2010/main" val="4140827137"/>
+        <p14:creationId xmlns:p14="http://schemas.microsoft.com/office/powerpoint/2010/main" val="3411295"/>
       </p:ext>
     </p:extLst>
   </p:cSld>
@@ -2015,6 +1994,9 @@
           <a:p>
             <a:endParaRPr lang="nb-NO" dirty="0"/>
           </a:p>
+          <a:p>
+            <a:endParaRPr lang="nb-NO" dirty="0"/>
+          </a:p>
         </p:txBody>
       </p:sp>
       <p:sp>
@@ -2034,7 +2016,7 @@
           <a:p>
             <a:fld id="{5DB155C7-787B-4005-9B48-59EDEA8A8FE0}" type="slidenum">
               <a:rPr lang="nb-NO" smtClean="0"/>
-              <a:t>14</a:t>
+              <a:t>11</a:t>
             </a:fld>
             <a:endParaRPr lang="nb-NO"/>
           </a:p>
@@ -2043,7 +2025,7 @@
     </p:spTree>
     <p:extLst>
       <p:ext uri="{BB962C8B-B14F-4D97-AF65-F5344CB8AC3E}">
-        <p14:creationId xmlns:p14="http://schemas.microsoft.com/office/powerpoint/2010/main" val="4219321998"/>
+        <p14:creationId xmlns:p14="http://schemas.microsoft.com/office/powerpoint/2010/main" val="2006123665"/>
       </p:ext>
     </p:extLst>
   </p:cSld>
@@ -2097,18 +2079,26 @@
           <a:bodyPr/>
           <a:lstStyle/>
           <a:p>
+            <a:pPr marL="0" marR="0" lvl="0" indent="0" algn="l" defTabSz="914400" rtl="0" eaLnBrk="1" fontAlgn="auto" latinLnBrk="0" hangingPunct="1">
+              <a:lnSpc>
+                <a:spcPct val="100000"/>
+              </a:lnSpc>
+              <a:spcBef>
+                <a:spcPts val="0"/>
+              </a:spcBef>
+              <a:spcAft>
+                <a:spcPts val="0"/>
+              </a:spcAft>
+              <a:buClrTx/>
+              <a:buSzTx/>
+              <a:buFontTx/>
+              <a:buNone/>
+              <a:tabLst/>
+              <a:defRPr/>
+            </a:pPr>
             <a:r>
               <a:rPr lang="en-US" dirty="0"/>
-              <a:t>Why not use a class? Records have value semantics and has operator overloading support.</a:t>
-            </a:r>
-          </a:p>
-          <a:p>
-            <a:endParaRPr lang="en-US" dirty="0"/>
-          </a:p>
-          <a:p>
-            <a:r>
-              <a:rPr lang="en-US" dirty="0"/>
-              <a:t>Use of constructor is discouraged as it can be called on an "instance" but behaves as a function returning a newly constructed record, unlike objects.</a:t>
+              <a:t>Defining an interface with an Invoke method with the correct signature allows one to assign an instance of that interface to a method reference variable.</a:t>
             </a:r>
           </a:p>
         </p:txBody>
@@ -2130,7 +2120,7 @@
           <a:p>
             <a:fld id="{5DB155C7-787B-4005-9B48-59EDEA8A8FE0}" type="slidenum">
               <a:rPr lang="nb-NO" smtClean="0"/>
-              <a:t>16</a:t>
+              <a:t>12</a:t>
             </a:fld>
             <a:endParaRPr lang="nb-NO"/>
           </a:p>
@@ -2139,7 +2129,7 @@
     </p:spTree>
     <p:extLst>
       <p:ext uri="{BB962C8B-B14F-4D97-AF65-F5344CB8AC3E}">
-        <p14:creationId xmlns:p14="http://schemas.microsoft.com/office/powerpoint/2010/main" val="2731333118"/>
+        <p14:creationId xmlns:p14="http://schemas.microsoft.com/office/powerpoint/2010/main" val="2525782143"/>
       </p:ext>
     </p:extLst>
   </p:cSld>
@@ -2194,18 +2184,63 @@
           <a:lstStyle/>
           <a:p>
             <a:r>
-              <a:rPr lang="en-US" dirty="0"/>
-              <a:t>Delegate to private interface instance to get reference semantics. Overloading implicit cast operator, so one can assign nil, to get a record behaving like an interface, I.e. reference semantics.</a:t>
-            </a:r>
-          </a:p>
-          <a:p>
-            <a:endParaRPr lang="en-US" dirty="0"/>
-          </a:p>
-          <a:p>
-            <a:r>
-              <a:rPr lang="en-US" dirty="0"/>
-              <a:t>Unlike for example C#, Delphi supports virtual class methods. This can be used to implement polymorphism while maintaining value semantics.</a:t>
-            </a:r>
+              <a:rPr lang="en-US" dirty="0">
+                <a:latin typeface="+mn-lt"/>
+              </a:rPr>
+              <a:t>The overloaded Invoke in </a:t>
+            </a:r>
+            <a:r>
+              <a:rPr lang="en-US" dirty="0" err="1">
+                <a:latin typeface="+mn-lt"/>
+                <a:cs typeface="Consolas" panose="020B0609020204030204" pitchFamily="49" charset="0"/>
+              </a:rPr>
+              <a:t>IIntegerObj</a:t>
+            </a:r>
+            <a:r>
+              <a:rPr lang="en-US" dirty="0">
+                <a:latin typeface="+mn-lt"/>
+              </a:rPr>
+              <a:t> has similar definition to what one would expect </a:t>
+            </a:r>
+            <a:r>
+              <a:rPr lang="en-US" dirty="0" err="1">
+                <a:latin typeface="+mn-lt"/>
+              </a:rPr>
+              <a:t>TIntegerProc</a:t>
+            </a:r>
+            <a:r>
+              <a:rPr lang="en-US" dirty="0">
+                <a:latin typeface="+mn-lt"/>
+              </a:rPr>
+              <a:t> to have, i.e. </a:t>
+            </a:r>
+            <a:r>
+              <a:rPr lang="en-US" dirty="0" err="1">
+                <a:latin typeface="+mn-lt"/>
+              </a:rPr>
+              <a:t>TIntegerProc</a:t>
+            </a:r>
+            <a:r>
+              <a:rPr lang="en-US" dirty="0">
+                <a:latin typeface="+mn-lt"/>
+              </a:rPr>
+              <a:t> = reference to procedure(</a:t>
+            </a:r>
+            <a:r>
+              <a:rPr lang="en-US" dirty="0" err="1">
+                <a:latin typeface="+mn-lt"/>
+              </a:rPr>
+              <a:t>const</a:t>
+            </a:r>
+            <a:r>
+              <a:rPr lang="en-US" dirty="0">
+                <a:latin typeface="+mn-lt"/>
+              </a:rPr>
+              <a:t> Value: integer);</a:t>
+            </a:r>
+            <a:endParaRPr lang="nb-NO" dirty="0">
+              <a:latin typeface="+mn-lt"/>
+            </a:endParaRPr>
           </a:p>
         </p:txBody>
       </p:sp>
@@ -2226,7 +2261,7 @@
           <a:p>
             <a:fld id="{5DB155C7-787B-4005-9B48-59EDEA8A8FE0}" type="slidenum">
               <a:rPr lang="nb-NO" smtClean="0"/>
-              <a:t>17</a:t>
+              <a:t>13</a:t>
             </a:fld>
             <a:endParaRPr lang="nb-NO"/>
           </a:p>
@@ -2235,7 +2270,7 @@
     </p:spTree>
     <p:extLst>
       <p:ext uri="{BB962C8B-B14F-4D97-AF65-F5344CB8AC3E}">
-        <p14:creationId xmlns:p14="http://schemas.microsoft.com/office/powerpoint/2010/main" val="3668292023"/>
+        <p14:creationId xmlns:p14="http://schemas.microsoft.com/office/powerpoint/2010/main" val="4140827137"/>
       </p:ext>
     </p:extLst>
   </p:cSld>
@@ -2310,7 +2345,7 @@
           <a:p>
             <a:fld id="{5DB155C7-787B-4005-9B48-59EDEA8A8FE0}" type="slidenum">
               <a:rPr lang="nb-NO" smtClean="0"/>
-              <a:t>18</a:t>
+              <a:t>14</a:t>
             </a:fld>
             <a:endParaRPr lang="nb-NO"/>
           </a:p>
@@ -2319,7 +2354,7 @@
     </p:spTree>
     <p:extLst>
       <p:ext uri="{BB962C8B-B14F-4D97-AF65-F5344CB8AC3E}">
-        <p14:creationId xmlns:p14="http://schemas.microsoft.com/office/powerpoint/2010/main" val="573841619"/>
+        <p14:creationId xmlns:p14="http://schemas.microsoft.com/office/powerpoint/2010/main" val="4219321998"/>
       </p:ext>
     </p:extLst>
   </p:cSld>
@@ -2373,15 +2408,7 @@
           <a:bodyPr/>
           <a:lstStyle/>
           <a:p>
-            <a:r>
-              <a:rPr lang="en-US" dirty="0" err="1"/>
-              <a:t>NewDingRec</a:t>
-            </a:r>
-            <a:r>
-              <a:rPr lang="en-US" dirty="0"/>
-              <a:t> is convenience constructor</a:t>
-            </a:r>
-            <a:endParaRPr lang="nb-NO" dirty="0"/>
+            <a:endParaRPr lang="nb-NO"/>
           </a:p>
         </p:txBody>
       </p:sp>
@@ -2402,7 +2429,7 @@
           <a:p>
             <a:fld id="{5DB155C7-787B-4005-9B48-59EDEA8A8FE0}" type="slidenum">
               <a:rPr lang="nb-NO" smtClean="0"/>
-              <a:t>19</a:t>
+              <a:t>15</a:t>
             </a:fld>
             <a:endParaRPr lang="nb-NO"/>
           </a:p>
@@ -2411,7 +2438,7 @@
     </p:spTree>
     <p:extLst>
       <p:ext uri="{BB962C8B-B14F-4D97-AF65-F5344CB8AC3E}">
-        <p14:creationId xmlns:p14="http://schemas.microsoft.com/office/powerpoint/2010/main" val="220813925"/>
+        <p14:creationId xmlns:p14="http://schemas.microsoft.com/office/powerpoint/2010/main" val="3228444824"/>
       </p:ext>
     </p:extLst>
   </p:cSld>
@@ -2465,7 +2492,19 @@
           <a:bodyPr/>
           <a:lstStyle/>
           <a:p>
+            <a:r>
+              <a:rPr lang="en-US" dirty="0"/>
+              <a:t>Why not use a class? Records have value semantics and has operator overloading support.</a:t>
+            </a:r>
+          </a:p>
+          <a:p>
             <a:endParaRPr lang="en-US" dirty="0"/>
+          </a:p>
+          <a:p>
+            <a:r>
+              <a:rPr lang="en-US" dirty="0"/>
+              <a:t>I discourage use of constructor as it can be called on an "instance" but behaves as a function returning a newly constructed record, unlike objects.</a:t>
+            </a:r>
           </a:p>
         </p:txBody>
       </p:sp>
@@ -2486,7 +2525,7 @@
           <a:p>
             <a:fld id="{5DB155C7-787B-4005-9B48-59EDEA8A8FE0}" type="slidenum">
               <a:rPr lang="nb-NO" smtClean="0"/>
-              <a:t>20</a:t>
+              <a:t>16</a:t>
             </a:fld>
             <a:endParaRPr lang="nb-NO"/>
           </a:p>
@@ -2495,7 +2534,7 @@
     </p:spTree>
     <p:extLst>
       <p:ext uri="{BB962C8B-B14F-4D97-AF65-F5344CB8AC3E}">
-        <p14:creationId xmlns:p14="http://schemas.microsoft.com/office/powerpoint/2010/main" val="4137420555"/>
+        <p14:creationId xmlns:p14="http://schemas.microsoft.com/office/powerpoint/2010/main" val="2731333118"/>
       </p:ext>
     </p:extLst>
   </p:cSld>
@@ -2549,7 +2588,19 @@
           <a:bodyPr/>
           <a:lstStyle/>
           <a:p>
+            <a:r>
+              <a:rPr lang="en-US" dirty="0"/>
+              <a:t>Delegate to private interface instance to get reference semantics. Overloading implicit cast operator, so one can assign nil, to get a record behaving like an interface, I.e. reference semantics.</a:t>
+            </a:r>
+          </a:p>
+          <a:p>
             <a:endParaRPr lang="en-US" dirty="0"/>
+          </a:p>
+          <a:p>
+            <a:r>
+              <a:rPr lang="en-US" dirty="0"/>
+              <a:t>Unlike for example C#, Delphi supports virtual class methods. This can be used to implement polymorphism while maintaining value semantics.</a:t>
+            </a:r>
           </a:p>
         </p:txBody>
       </p:sp>
@@ -2570,7 +2621,7 @@
           <a:p>
             <a:fld id="{5DB155C7-787B-4005-9B48-59EDEA8A8FE0}" type="slidenum">
               <a:rPr lang="nb-NO" smtClean="0"/>
-              <a:t>21</a:t>
+              <a:t>17</a:t>
             </a:fld>
             <a:endParaRPr lang="nb-NO"/>
           </a:p>
@@ -2579,7 +2630,7 @@
     </p:spTree>
     <p:extLst>
       <p:ext uri="{BB962C8B-B14F-4D97-AF65-F5344CB8AC3E}">
-        <p14:creationId xmlns:p14="http://schemas.microsoft.com/office/powerpoint/2010/main" val="987658429"/>
+        <p14:creationId xmlns:p14="http://schemas.microsoft.com/office/powerpoint/2010/main" val="3668292023"/>
       </p:ext>
     </p:extLst>
   </p:cSld>
@@ -2633,7 +2684,7 @@
           <a:bodyPr/>
           <a:lstStyle/>
           <a:p>
-            <a:endParaRPr lang="en-US" dirty="0"/>
+            <a:endParaRPr lang="nb-NO" dirty="0"/>
           </a:p>
         </p:txBody>
       </p:sp>
@@ -2654,7 +2705,7 @@
           <a:p>
             <a:fld id="{5DB155C7-787B-4005-9B48-59EDEA8A8FE0}" type="slidenum">
               <a:rPr lang="nb-NO" smtClean="0"/>
-              <a:t>22</a:t>
+              <a:t>18</a:t>
             </a:fld>
             <a:endParaRPr lang="nb-NO"/>
           </a:p>
@@ -2663,7 +2714,7 @@
     </p:spTree>
     <p:extLst>
       <p:ext uri="{BB962C8B-B14F-4D97-AF65-F5344CB8AC3E}">
-        <p14:creationId xmlns:p14="http://schemas.microsoft.com/office/powerpoint/2010/main" val="78277277"/>
+        <p14:creationId xmlns:p14="http://schemas.microsoft.com/office/powerpoint/2010/main" val="573841619"/>
       </p:ext>
     </p:extLst>
   </p:cSld>
@@ -2717,7 +2768,15 @@
           <a:bodyPr/>
           <a:lstStyle/>
           <a:p>
-            <a:endParaRPr lang="en-US" dirty="0"/>
+            <a:r>
+              <a:rPr lang="en-US" dirty="0" err="1"/>
+              <a:t>NewDingRec</a:t>
+            </a:r>
+            <a:r>
+              <a:rPr lang="en-US" dirty="0"/>
+              <a:t> is convenience constructor</a:t>
+            </a:r>
+            <a:endParaRPr lang="nb-NO" dirty="0"/>
           </a:p>
         </p:txBody>
       </p:sp>
@@ -2738,7 +2797,7 @@
           <a:p>
             <a:fld id="{5DB155C7-787B-4005-9B48-59EDEA8A8FE0}" type="slidenum">
               <a:rPr lang="nb-NO" smtClean="0"/>
-              <a:t>24</a:t>
+              <a:t>19</a:t>
             </a:fld>
             <a:endParaRPr lang="nb-NO"/>
           </a:p>
@@ -2747,7 +2806,7 @@
     </p:spTree>
     <p:extLst>
       <p:ext uri="{BB962C8B-B14F-4D97-AF65-F5344CB8AC3E}">
-        <p14:creationId xmlns:p14="http://schemas.microsoft.com/office/powerpoint/2010/main" val="4208139004"/>
+        <p14:creationId xmlns:p14="http://schemas.microsoft.com/office/powerpoint/2010/main" val="220813925"/>
       </p:ext>
     </p:extLst>
   </p:cSld>
@@ -2827,7 +2886,7 @@
             </a:r>
             <a:r>
               <a:rPr lang="nb-NO" dirty="0" err="1"/>
-              <a:t>beinning</a:t>
+              <a:t>beginning</a:t>
             </a:r>
             <a:r>
               <a:rPr lang="nb-NO" dirty="0"/>
@@ -2959,7 +3018,7 @@
           <a:bodyPr/>
           <a:lstStyle/>
           <a:p>
-            <a:endParaRPr lang="nb-NO" dirty="0"/>
+            <a:endParaRPr lang="en-US" dirty="0"/>
           </a:p>
         </p:txBody>
       </p:sp>
@@ -2980,7 +3039,7 @@
           <a:p>
             <a:fld id="{5DB155C7-787B-4005-9B48-59EDEA8A8FE0}" type="slidenum">
               <a:rPr lang="nb-NO" smtClean="0"/>
-              <a:t>28</a:t>
+              <a:t>20</a:t>
             </a:fld>
             <a:endParaRPr lang="nb-NO"/>
           </a:p>
@@ -2989,7 +3048,7 @@
     </p:spTree>
     <p:extLst>
       <p:ext uri="{BB962C8B-B14F-4D97-AF65-F5344CB8AC3E}">
-        <p14:creationId xmlns:p14="http://schemas.microsoft.com/office/powerpoint/2010/main" val="3000749783"/>
+        <p14:creationId xmlns:p14="http://schemas.microsoft.com/office/powerpoint/2010/main" val="4137420555"/>
       </p:ext>
     </p:extLst>
   </p:cSld>
@@ -3043,11 +3102,7 @@
           <a:bodyPr/>
           <a:lstStyle/>
           <a:p>
-            <a:r>
-              <a:rPr lang="en-US" dirty="0"/>
-              <a:t>One limitation is that tag errors cannot be caught at compile-time.</a:t>
-            </a:r>
-            <a:endParaRPr lang="nb-NO" dirty="0"/>
+            <a:endParaRPr lang="en-US" dirty="0"/>
           </a:p>
         </p:txBody>
       </p:sp>
@@ -3068,7 +3123,7 @@
           <a:p>
             <a:fld id="{5DB155C7-787B-4005-9B48-59EDEA8A8FE0}" type="slidenum">
               <a:rPr lang="nb-NO" smtClean="0"/>
-              <a:t>30</a:t>
+              <a:t>21</a:t>
             </a:fld>
             <a:endParaRPr lang="nb-NO"/>
           </a:p>
@@ -3077,7 +3132,7 @@
     </p:spTree>
     <p:extLst>
       <p:ext uri="{BB962C8B-B14F-4D97-AF65-F5344CB8AC3E}">
-        <p14:creationId xmlns:p14="http://schemas.microsoft.com/office/powerpoint/2010/main" val="3828631161"/>
+        <p14:creationId xmlns:p14="http://schemas.microsoft.com/office/powerpoint/2010/main" val="987658429"/>
       </p:ext>
     </p:extLst>
   </p:cSld>
@@ -3131,7 +3186,7 @@
           <a:bodyPr/>
           <a:lstStyle/>
           <a:p>
-            <a:endParaRPr lang="nb-NO" dirty="0"/>
+            <a:endParaRPr lang="en-US" dirty="0"/>
           </a:p>
         </p:txBody>
       </p:sp>
@@ -3152,7 +3207,7 @@
           <a:p>
             <a:fld id="{5DB155C7-787B-4005-9B48-59EDEA8A8FE0}" type="slidenum">
               <a:rPr lang="nb-NO" smtClean="0"/>
-              <a:t>31</a:t>
+              <a:t>22</a:t>
             </a:fld>
             <a:endParaRPr lang="nb-NO"/>
           </a:p>
@@ -3161,7 +3216,7 @@
     </p:spTree>
     <p:extLst>
       <p:ext uri="{BB962C8B-B14F-4D97-AF65-F5344CB8AC3E}">
-        <p14:creationId xmlns:p14="http://schemas.microsoft.com/office/powerpoint/2010/main" val="996700068"/>
+        <p14:creationId xmlns:p14="http://schemas.microsoft.com/office/powerpoint/2010/main" val="78277277"/>
       </p:ext>
     </p:extLst>
   </p:cSld>
@@ -3215,19 +3270,7 @@
           <a:bodyPr/>
           <a:lstStyle/>
           <a:p>
-            <a:r>
-              <a:rPr lang="en-US" dirty="0"/>
-              <a:t>Assembly output from </a:t>
-            </a:r>
-            <a:r>
-              <a:rPr lang="en-US" dirty="0" err="1"/>
-              <a:t>TRec.Ping</a:t>
-            </a:r>
-            <a:r>
-              <a:rPr lang="en-US"/>
-              <a:t> body.</a:t>
-            </a:r>
-            <a:endParaRPr lang="nb-NO" dirty="0"/>
+            <a:endParaRPr lang="nb-NO"/>
           </a:p>
         </p:txBody>
       </p:sp>
@@ -3248,7 +3291,7 @@
           <a:p>
             <a:fld id="{5DB155C7-787B-4005-9B48-59EDEA8A8FE0}" type="slidenum">
               <a:rPr lang="nb-NO" smtClean="0"/>
-              <a:t>32</a:t>
+              <a:t>23</a:t>
             </a:fld>
             <a:endParaRPr lang="nb-NO"/>
           </a:p>
@@ -3257,7 +3300,7 @@
     </p:spTree>
     <p:extLst>
       <p:ext uri="{BB962C8B-B14F-4D97-AF65-F5344CB8AC3E}">
-        <p14:creationId xmlns:p14="http://schemas.microsoft.com/office/powerpoint/2010/main" val="958722871"/>
+        <p14:creationId xmlns:p14="http://schemas.microsoft.com/office/powerpoint/2010/main" val="464467011"/>
       </p:ext>
     </p:extLst>
   </p:cSld>
@@ -3311,19 +3354,7 @@
           <a:bodyPr/>
           <a:lstStyle/>
           <a:p>
-            <a:r>
-              <a:rPr lang="en-US" dirty="0"/>
-              <a:t>Use nested type declaration as namespace for bind </a:t>
-            </a:r>
-            <a:r>
-              <a:rPr lang="en-US" dirty="0" err="1"/>
-              <a:t>arg</a:t>
-            </a:r>
-            <a:r>
-              <a:rPr lang="en-US" dirty="0"/>
-              <a:t> types, to avoid name clashes for other things which may want to use the same name for tag dispatching.</a:t>
-            </a:r>
-            <a:endParaRPr lang="nb-NO" dirty="0"/>
+            <a:endParaRPr lang="en-US" dirty="0"/>
           </a:p>
         </p:txBody>
       </p:sp>
@@ -3344,7 +3375,7 @@
           <a:p>
             <a:fld id="{5DB155C7-787B-4005-9B48-59EDEA8A8FE0}" type="slidenum">
               <a:rPr lang="nb-NO" smtClean="0"/>
-              <a:t>34</a:t>
+              <a:t>24</a:t>
             </a:fld>
             <a:endParaRPr lang="nb-NO"/>
           </a:p>
@@ -3353,7 +3384,7 @@
     </p:spTree>
     <p:extLst>
       <p:ext uri="{BB962C8B-B14F-4D97-AF65-F5344CB8AC3E}">
-        <p14:creationId xmlns:p14="http://schemas.microsoft.com/office/powerpoint/2010/main" val="1046490357"/>
+        <p14:creationId xmlns:p14="http://schemas.microsoft.com/office/powerpoint/2010/main" val="4208139004"/>
       </p:ext>
     </p:extLst>
   </p:cSld>
@@ -3407,26 +3438,7 @@
           <a:bodyPr/>
           <a:lstStyle/>
           <a:p>
-            <a:r>
-              <a:rPr lang="nb-NO" dirty="0"/>
-              <a:t>No </a:t>
-            </a:r>
-            <a:r>
-              <a:rPr lang="nb-NO" dirty="0" err="1"/>
-              <a:t>magic</a:t>
-            </a:r>
-            <a:r>
-              <a:rPr lang="nb-NO" dirty="0"/>
-              <a:t>, just </a:t>
-            </a:r>
-            <a:r>
-              <a:rPr lang="nb-NO" dirty="0" err="1"/>
-              <a:t>convenience</a:t>
-            </a:r>
-            <a:r>
-              <a:rPr lang="nb-NO" dirty="0"/>
-              <a:t>.</a:t>
-            </a:r>
+            <a:endParaRPr lang="nb-NO"/>
           </a:p>
         </p:txBody>
       </p:sp>
@@ -3447,7 +3459,7 @@
           <a:p>
             <a:fld id="{5DB155C7-787B-4005-9B48-59EDEA8A8FE0}" type="slidenum">
               <a:rPr lang="nb-NO" smtClean="0"/>
-              <a:t>35</a:t>
+              <a:t>25</a:t>
             </a:fld>
             <a:endParaRPr lang="nb-NO"/>
           </a:p>
@@ -3456,7 +3468,7 @@
     </p:spTree>
     <p:extLst>
       <p:ext uri="{BB962C8B-B14F-4D97-AF65-F5344CB8AC3E}">
-        <p14:creationId xmlns:p14="http://schemas.microsoft.com/office/powerpoint/2010/main" val="4120446591"/>
+        <p14:creationId xmlns:p14="http://schemas.microsoft.com/office/powerpoint/2010/main" val="267769739"/>
       </p:ext>
     </p:extLst>
   </p:cSld>
@@ -3510,27 +3522,7 @@
           <a:bodyPr/>
           <a:lstStyle/>
           <a:p>
-            <a:r>
-              <a:rPr lang="en-US" dirty="0"/>
-              <a:t>Bind True as the </a:t>
-            </a:r>
-            <a:r>
-              <a:rPr lang="en-US" dirty="0" err="1"/>
-              <a:t>UseBoolStrs</a:t>
-            </a:r>
-            <a:r>
-              <a:rPr lang="en-US" dirty="0"/>
-              <a:t> argument of </a:t>
-            </a:r>
-            <a:r>
-              <a:rPr lang="en-US" dirty="0" err="1"/>
-              <a:t>BoolToStr</a:t>
-            </a:r>
-            <a:r>
-              <a:rPr lang="en-US" dirty="0"/>
-              <a:t>.</a:t>
-            </a:r>
-            <a:endParaRPr lang="nb-NO" dirty="0"/>
+            <a:endParaRPr lang="nb-NO"/>
           </a:p>
         </p:txBody>
       </p:sp>
@@ -3551,7 +3543,7 @@
           <a:p>
             <a:fld id="{5DB155C7-787B-4005-9B48-59EDEA8A8FE0}" type="slidenum">
               <a:rPr lang="nb-NO" smtClean="0"/>
-              <a:t>36</a:t>
+              <a:t>26</a:t>
             </a:fld>
             <a:endParaRPr lang="nb-NO"/>
           </a:p>
@@ -3560,7 +3552,7 @@
     </p:spTree>
     <p:extLst>
       <p:ext uri="{BB962C8B-B14F-4D97-AF65-F5344CB8AC3E}">
-        <p14:creationId xmlns:p14="http://schemas.microsoft.com/office/powerpoint/2010/main" val="1855520758"/>
+        <p14:creationId xmlns:p14="http://schemas.microsoft.com/office/powerpoint/2010/main" val="1142447769"/>
       </p:ext>
     </p:extLst>
   </p:cSld>
@@ -3614,70 +3606,7 @@
           <a:bodyPr/>
           <a:lstStyle/>
           <a:p>
-            <a:r>
-              <a:rPr lang="nb-NO" dirty="0" err="1"/>
-              <a:t>Other</a:t>
-            </a:r>
-            <a:r>
-              <a:rPr lang="nb-NO" dirty="0"/>
-              <a:t> </a:t>
-            </a:r>
-            <a:r>
-              <a:rPr lang="nb-NO" dirty="0" err="1"/>
-              <a:t>overloads</a:t>
-            </a:r>
-            <a:r>
-              <a:rPr lang="nb-NO" dirty="0"/>
-              <a:t> </a:t>
-            </a:r>
-            <a:r>
-              <a:rPr lang="nb-NO" dirty="0" err="1"/>
-              <a:t>are</a:t>
-            </a:r>
-            <a:r>
-              <a:rPr lang="nb-NO" dirty="0"/>
-              <a:t> </a:t>
-            </a:r>
-            <a:r>
-              <a:rPr lang="nb-NO" dirty="0" err="1"/>
-              <a:t>also</a:t>
-            </a:r>
-            <a:r>
-              <a:rPr lang="nb-NO" dirty="0"/>
-              <a:t> </a:t>
-            </a:r>
-            <a:r>
-              <a:rPr lang="nb-NO" dirty="0" err="1"/>
-              <a:t>possible</a:t>
-            </a:r>
-            <a:r>
-              <a:rPr lang="nb-NO" dirty="0"/>
-              <a:t> </a:t>
-            </a:r>
-            <a:r>
-              <a:rPr lang="nb-NO" dirty="0" err="1"/>
-              <a:t>of</a:t>
-            </a:r>
-            <a:r>
-              <a:rPr lang="nb-NO" dirty="0"/>
-              <a:t> </a:t>
-            </a:r>
-            <a:r>
-              <a:rPr lang="nb-NO" dirty="0" err="1"/>
-              <a:t>course</a:t>
-            </a:r>
-            <a:r>
-              <a:rPr lang="nb-NO" dirty="0"/>
-              <a:t>, like </a:t>
-            </a:r>
-            <a:r>
-              <a:rPr lang="nb-NO" dirty="0" err="1"/>
-              <a:t>switching</a:t>
-            </a:r>
-            <a:r>
-              <a:rPr lang="nb-NO" dirty="0"/>
-              <a:t> argument order etc.</a:t>
-            </a:r>
+            <a:endParaRPr lang="nb-NO"/>
           </a:p>
         </p:txBody>
       </p:sp>
@@ -3698,7 +3627,7 @@
           <a:p>
             <a:fld id="{5DB155C7-787B-4005-9B48-59EDEA8A8FE0}" type="slidenum">
               <a:rPr lang="nb-NO" smtClean="0"/>
-              <a:t>37</a:t>
+              <a:t>27</a:t>
             </a:fld>
             <a:endParaRPr lang="nb-NO"/>
           </a:p>
@@ -3707,7 +3636,7 @@
     </p:spTree>
     <p:extLst>
       <p:ext uri="{BB962C8B-B14F-4D97-AF65-F5344CB8AC3E}">
-        <p14:creationId xmlns:p14="http://schemas.microsoft.com/office/powerpoint/2010/main" val="619705011"/>
+        <p14:creationId xmlns:p14="http://schemas.microsoft.com/office/powerpoint/2010/main" val="1320322360"/>
       </p:ext>
     </p:extLst>
   </p:cSld>
@@ -3782,7 +3711,7 @@
           <a:p>
             <a:fld id="{5DB155C7-787B-4005-9B48-59EDEA8A8FE0}" type="slidenum">
               <a:rPr lang="nb-NO" smtClean="0"/>
-              <a:t>38</a:t>
+              <a:t>28</a:t>
             </a:fld>
             <a:endParaRPr lang="nb-NO"/>
           </a:p>
@@ -3791,7 +3720,7 @@
     </p:spTree>
     <p:extLst>
       <p:ext uri="{BB962C8B-B14F-4D97-AF65-F5344CB8AC3E}">
-        <p14:creationId xmlns:p14="http://schemas.microsoft.com/office/powerpoint/2010/main" val="1084450233"/>
+        <p14:creationId xmlns:p14="http://schemas.microsoft.com/office/powerpoint/2010/main" val="3000749783"/>
       </p:ext>
     </p:extLst>
   </p:cSld>
@@ -3845,7 +3774,7 @@
           <a:bodyPr/>
           <a:lstStyle/>
           <a:p>
-            <a:endParaRPr lang="nb-NO" dirty="0"/>
+            <a:endParaRPr lang="nb-NO"/>
           </a:p>
         </p:txBody>
       </p:sp>
@@ -3866,7 +3795,7 @@
           <a:p>
             <a:fld id="{5DB155C7-787B-4005-9B48-59EDEA8A8FE0}" type="slidenum">
               <a:rPr lang="nb-NO" smtClean="0"/>
-              <a:t>39</a:t>
+              <a:t>29</a:t>
             </a:fld>
             <a:endParaRPr lang="nb-NO"/>
           </a:p>
@@ -3875,7 +3804,7 @@
     </p:spTree>
     <p:extLst>
       <p:ext uri="{BB962C8B-B14F-4D97-AF65-F5344CB8AC3E}">
-        <p14:creationId xmlns:p14="http://schemas.microsoft.com/office/powerpoint/2010/main" val="2795814422"/>
+        <p14:creationId xmlns:p14="http://schemas.microsoft.com/office/powerpoint/2010/main" val="3737698789"/>
       </p:ext>
     </p:extLst>
   </p:cSld>
@@ -3931,7 +3860,7 @@
           <a:p>
             <a:r>
               <a:rPr lang="en-US" dirty="0"/>
-              <a:t>Features introduced since Delphi 2005.</a:t>
+              <a:t>Language features introduced since Delphi 2005.</a:t>
             </a:r>
           </a:p>
           <a:p>
@@ -4019,6 +3948,10 @@
           <a:bodyPr/>
           <a:lstStyle/>
           <a:p>
+            <a:r>
+              <a:rPr lang="en-US" dirty="0"/>
+              <a:t>One limitation is that tag errors cannot be caught at compile-time.</a:t>
+            </a:r>
             <a:endParaRPr lang="nb-NO" dirty="0"/>
           </a:p>
         </p:txBody>
@@ -4040,7 +3973,7 @@
           <a:p>
             <a:fld id="{5DB155C7-787B-4005-9B48-59EDEA8A8FE0}" type="slidenum">
               <a:rPr lang="nb-NO" smtClean="0"/>
-              <a:t>40</a:t>
+              <a:t>30</a:t>
             </a:fld>
             <a:endParaRPr lang="nb-NO"/>
           </a:p>
@@ -4049,7 +3982,7 @@
     </p:spTree>
     <p:extLst>
       <p:ext uri="{BB962C8B-B14F-4D97-AF65-F5344CB8AC3E}">
-        <p14:creationId xmlns:p14="http://schemas.microsoft.com/office/powerpoint/2010/main" val="1930628358"/>
+        <p14:creationId xmlns:p14="http://schemas.microsoft.com/office/powerpoint/2010/main" val="3828631161"/>
       </p:ext>
     </p:extLst>
   </p:cSld>
@@ -4124,7 +4057,7 @@
           <a:p>
             <a:fld id="{5DB155C7-787B-4005-9B48-59EDEA8A8FE0}" type="slidenum">
               <a:rPr lang="nb-NO" smtClean="0"/>
-              <a:t>41</a:t>
+              <a:t>31</a:t>
             </a:fld>
             <a:endParaRPr lang="nb-NO"/>
           </a:p>
@@ -4133,7 +4066,7 @@
     </p:spTree>
     <p:extLst>
       <p:ext uri="{BB962C8B-B14F-4D97-AF65-F5344CB8AC3E}">
-        <p14:creationId xmlns:p14="http://schemas.microsoft.com/office/powerpoint/2010/main" val="1346582364"/>
+        <p14:creationId xmlns:p14="http://schemas.microsoft.com/office/powerpoint/2010/main" val="996700068"/>
       </p:ext>
     </p:extLst>
   </p:cSld>
@@ -4187,6 +4120,18 @@
           <a:bodyPr/>
           <a:lstStyle/>
           <a:p>
+            <a:r>
+              <a:rPr lang="en-US" dirty="0"/>
+              <a:t>Assembly output from </a:t>
+            </a:r>
+            <a:r>
+              <a:rPr lang="en-US" dirty="0" err="1"/>
+              <a:t>TRec.Ping</a:t>
+            </a:r>
+            <a:r>
+              <a:rPr lang="en-US"/>
+              <a:t> body.</a:t>
+            </a:r>
             <a:endParaRPr lang="nb-NO" dirty="0"/>
           </a:p>
         </p:txBody>
@@ -4208,7 +4153,7 @@
           <a:p>
             <a:fld id="{5DB155C7-787B-4005-9B48-59EDEA8A8FE0}" type="slidenum">
               <a:rPr lang="nb-NO" smtClean="0"/>
-              <a:t>42</a:t>
+              <a:t>32</a:t>
             </a:fld>
             <a:endParaRPr lang="nb-NO"/>
           </a:p>
@@ -4217,7 +4162,7 @@
     </p:spTree>
     <p:extLst>
       <p:ext uri="{BB962C8B-B14F-4D97-AF65-F5344CB8AC3E}">
-        <p14:creationId xmlns:p14="http://schemas.microsoft.com/office/powerpoint/2010/main" val="3040820318"/>
+        <p14:creationId xmlns:p14="http://schemas.microsoft.com/office/powerpoint/2010/main" val="958722871"/>
       </p:ext>
     </p:extLst>
   </p:cSld>
@@ -4271,79 +4216,7 @@
           <a:bodyPr/>
           <a:lstStyle/>
           <a:p>
-            <a:r>
-              <a:rPr lang="nb-NO" dirty="0"/>
-              <a:t>Channel </a:t>
-            </a:r>
-            <a:r>
-              <a:rPr lang="nb-NO" dirty="0" err="1"/>
-              <a:t>example</a:t>
-            </a:r>
-            <a:r>
-              <a:rPr lang="nb-NO" dirty="0"/>
-              <a:t> </a:t>
-            </a:r>
-            <a:r>
-              <a:rPr lang="nb-NO" dirty="0" err="1"/>
-              <a:t>inspired</a:t>
-            </a:r>
-            <a:r>
-              <a:rPr lang="nb-NO" dirty="0"/>
-              <a:t> by Go </a:t>
-            </a:r>
-            <a:r>
-              <a:rPr lang="nb-NO" dirty="0" err="1"/>
-              <a:t>channels</a:t>
-            </a:r>
-            <a:r>
-              <a:rPr lang="nb-NO" dirty="0"/>
-              <a:t>.</a:t>
-            </a:r>
-          </a:p>
-          <a:p>
-            <a:endParaRPr lang="nb-NO" dirty="0"/>
-          </a:p>
-          <a:p>
-            <a:r>
-              <a:rPr lang="nb-NO" dirty="0" err="1"/>
-              <a:t>Also</a:t>
-            </a:r>
-            <a:r>
-              <a:rPr lang="nb-NO" dirty="0"/>
-              <a:t> showcases record </a:t>
-            </a:r>
-            <a:r>
-              <a:rPr lang="nb-NO" dirty="0" err="1"/>
-              <a:t>delegating</a:t>
-            </a:r>
-            <a:r>
-              <a:rPr lang="nb-NO" dirty="0"/>
-              <a:t> to </a:t>
-            </a:r>
-            <a:r>
-              <a:rPr lang="nb-NO" dirty="0" err="1"/>
-              <a:t>interface</a:t>
-            </a:r>
-            <a:r>
-              <a:rPr lang="nb-NO" dirty="0"/>
-              <a:t> for </a:t>
-            </a:r>
-            <a:r>
-              <a:rPr lang="nb-NO" dirty="0" err="1"/>
-              <a:t>reference</a:t>
-            </a:r>
-            <a:r>
-              <a:rPr lang="nb-NO" dirty="0"/>
-              <a:t> </a:t>
-            </a:r>
-            <a:r>
-              <a:rPr lang="nb-NO" dirty="0" err="1"/>
-              <a:t>semantics</a:t>
-            </a:r>
-            <a:r>
-              <a:rPr lang="nb-NO" dirty="0"/>
-              <a:t>.</a:t>
-            </a:r>
+            <a:endParaRPr lang="nb-NO"/>
           </a:p>
         </p:txBody>
       </p:sp>
@@ -4364,7 +4237,7 @@
           <a:p>
             <a:fld id="{5DB155C7-787B-4005-9B48-59EDEA8A8FE0}" type="slidenum">
               <a:rPr lang="nb-NO" smtClean="0"/>
-              <a:t>43</a:t>
+              <a:t>33</a:t>
             </a:fld>
             <a:endParaRPr lang="nb-NO"/>
           </a:p>
@@ -4373,7 +4246,7 @@
     </p:spTree>
     <p:extLst>
       <p:ext uri="{BB962C8B-B14F-4D97-AF65-F5344CB8AC3E}">
-        <p14:creationId xmlns:p14="http://schemas.microsoft.com/office/powerpoint/2010/main" val="3542102874"/>
+        <p14:creationId xmlns:p14="http://schemas.microsoft.com/office/powerpoint/2010/main" val="179632041"/>
       </p:ext>
     </p:extLst>
   </p:cSld>
@@ -4427,6 +4300,18 @@
           <a:bodyPr/>
           <a:lstStyle/>
           <a:p>
+            <a:r>
+              <a:rPr lang="en-US" dirty="0"/>
+              <a:t>Use nested type declaration as namespace for bind </a:t>
+            </a:r>
+            <a:r>
+              <a:rPr lang="en-US" dirty="0" err="1"/>
+              <a:t>arg</a:t>
+            </a:r>
+            <a:r>
+              <a:rPr lang="en-US" dirty="0"/>
+              <a:t> types, to avoid name clashes for other things which may want to use the same name for tag dispatching.</a:t>
+            </a:r>
             <a:endParaRPr lang="nb-NO" dirty="0"/>
           </a:p>
         </p:txBody>
@@ -4448,7 +4333,7 @@
           <a:p>
             <a:fld id="{5DB155C7-787B-4005-9B48-59EDEA8A8FE0}" type="slidenum">
               <a:rPr lang="nb-NO" smtClean="0"/>
-              <a:t>44</a:t>
+              <a:t>34</a:t>
             </a:fld>
             <a:endParaRPr lang="nb-NO"/>
           </a:p>
@@ -4457,7 +4342,7 @@
     </p:spTree>
     <p:extLst>
       <p:ext uri="{BB962C8B-B14F-4D97-AF65-F5344CB8AC3E}">
-        <p14:creationId xmlns:p14="http://schemas.microsoft.com/office/powerpoint/2010/main" val="4285391064"/>
+        <p14:creationId xmlns:p14="http://schemas.microsoft.com/office/powerpoint/2010/main" val="1046490357"/>
       </p:ext>
     </p:extLst>
   </p:cSld>
@@ -4512,14 +4397,25 @@
           <a:lstStyle/>
           <a:p>
             <a:r>
-              <a:rPr lang="en-US" dirty="0"/>
-              <a:t>The overloaded less-or-equal operator returns false once the channel is closed, and writes the value from the channel into the </a:t>
-            </a:r>
-            <a:r>
-              <a:rPr lang="en-US"/>
-              <a:t>left-hand operand.</a:t>
-            </a:r>
-            <a:endParaRPr lang="nb-NO" dirty="0"/>
+              <a:rPr lang="nb-NO" dirty="0"/>
+              <a:t>No </a:t>
+            </a:r>
+            <a:r>
+              <a:rPr lang="nb-NO" dirty="0" err="1"/>
+              <a:t>magic</a:t>
+            </a:r>
+            <a:r>
+              <a:rPr lang="nb-NO" dirty="0"/>
+              <a:t>, Bind&lt;&gt; is just </a:t>
+            </a:r>
+            <a:r>
+              <a:rPr lang="nb-NO" dirty="0" err="1"/>
+              <a:t>convenience</a:t>
+            </a:r>
+            <a:r>
+              <a:rPr lang="nb-NO" dirty="0"/>
+              <a:t>.</a:t>
+            </a:r>
           </a:p>
         </p:txBody>
       </p:sp>
@@ -4540,7 +4436,7 @@
           <a:p>
             <a:fld id="{5DB155C7-787B-4005-9B48-59EDEA8A8FE0}" type="slidenum">
               <a:rPr lang="nb-NO" smtClean="0"/>
-              <a:t>45</a:t>
+              <a:t>35</a:t>
             </a:fld>
             <a:endParaRPr lang="nb-NO"/>
           </a:p>
@@ -4549,7 +4445,7 @@
     </p:spTree>
     <p:extLst>
       <p:ext uri="{BB962C8B-B14F-4D97-AF65-F5344CB8AC3E}">
-        <p14:creationId xmlns:p14="http://schemas.microsoft.com/office/powerpoint/2010/main" val="1112766777"/>
+        <p14:creationId xmlns:p14="http://schemas.microsoft.com/office/powerpoint/2010/main" val="4120446591"/>
       </p:ext>
     </p:extLst>
   </p:cSld>
@@ -4603,6 +4499,26 @@
           <a:bodyPr/>
           <a:lstStyle/>
           <a:p>
+            <a:r>
+              <a:rPr lang="en-US" dirty="0"/>
+              <a:t>Bind True as the </a:t>
+            </a:r>
+            <a:r>
+              <a:rPr lang="en-US" dirty="0" err="1"/>
+              <a:t>UseBoolStrs</a:t>
+            </a:r>
+            <a:r>
+              <a:rPr lang="en-US" dirty="0"/>
+              <a:t> argument of </a:t>
+            </a:r>
+            <a:r>
+              <a:rPr lang="en-US" dirty="0" err="1"/>
+              <a:t>BoolToStr</a:t>
+            </a:r>
+            <a:r>
+              <a:rPr lang="en-US" dirty="0"/>
+              <a:t>, so we don’t have to pass it every time.</a:t>
+            </a:r>
             <a:endParaRPr lang="nb-NO" dirty="0"/>
           </a:p>
         </p:txBody>
@@ -4624,7 +4540,7 @@
           <a:p>
             <a:fld id="{5DB155C7-787B-4005-9B48-59EDEA8A8FE0}" type="slidenum">
               <a:rPr lang="nb-NO" smtClean="0"/>
-              <a:t>46</a:t>
+              <a:t>36</a:t>
             </a:fld>
             <a:endParaRPr lang="nb-NO"/>
           </a:p>
@@ -4633,7 +4549,322 @@
     </p:spTree>
     <p:extLst>
       <p:ext uri="{BB962C8B-B14F-4D97-AF65-F5344CB8AC3E}">
-        <p14:creationId xmlns:p14="http://schemas.microsoft.com/office/powerpoint/2010/main" val="4205728534"/>
+        <p14:creationId xmlns:p14="http://schemas.microsoft.com/office/powerpoint/2010/main" val="1855520758"/>
+      </p:ext>
+    </p:extLst>
+  </p:cSld>
+  <p:clrMapOvr>
+    <a:masterClrMapping/>
+  </p:clrMapOvr>
+</p:notes>
+</file>
+
+<file path=ppt/notesSlides/notesSlide37.xml><?xml version="1.0" encoding="utf-8"?>
+<p:notes xmlns:a="http://schemas.openxmlformats.org/drawingml/2006/main" xmlns:r="http://schemas.openxmlformats.org/officeDocument/2006/relationships" xmlns:p="http://schemas.openxmlformats.org/presentationml/2006/main">
+  <p:cSld>
+    <p:spTree>
+      <p:nvGrpSpPr>
+        <p:cNvPr id="1" name=""/>
+        <p:cNvGrpSpPr/>
+        <p:nvPr/>
+      </p:nvGrpSpPr>
+      <p:grpSpPr>
+        <a:xfrm>
+          <a:off x="0" y="0"/>
+          <a:ext cx="0" cy="0"/>
+          <a:chOff x="0" y="0"/>
+          <a:chExt cx="0" cy="0"/>
+        </a:xfrm>
+      </p:grpSpPr>
+      <p:sp>
+        <p:nvSpPr>
+          <p:cNvPr id="2" name="Plassholder for lysbilde 1"/>
+          <p:cNvSpPr>
+            <a:spLocks noGrp="1" noRot="1" noChangeAspect="1"/>
+          </p:cNvSpPr>
+          <p:nvPr>
+            <p:ph type="sldImg"/>
+          </p:nvPr>
+        </p:nvSpPr>
+        <p:spPr/>
+      </p:sp>
+      <p:sp>
+        <p:nvSpPr>
+          <p:cNvPr id="3" name="Plassholder for notater 2"/>
+          <p:cNvSpPr>
+            <a:spLocks noGrp="1"/>
+          </p:cNvSpPr>
+          <p:nvPr>
+            <p:ph type="body" idx="1"/>
+          </p:nvPr>
+        </p:nvSpPr>
+        <p:spPr/>
+        <p:txBody>
+          <a:bodyPr/>
+          <a:lstStyle/>
+          <a:p>
+            <a:r>
+              <a:rPr lang="nb-NO" dirty="0" err="1"/>
+              <a:t>Other</a:t>
+            </a:r>
+            <a:r>
+              <a:rPr lang="nb-NO" dirty="0"/>
+              <a:t> </a:t>
+            </a:r>
+            <a:r>
+              <a:rPr lang="nb-NO" dirty="0" err="1"/>
+              <a:t>overloads</a:t>
+            </a:r>
+            <a:r>
+              <a:rPr lang="nb-NO" dirty="0"/>
+              <a:t> </a:t>
+            </a:r>
+            <a:r>
+              <a:rPr lang="nb-NO" dirty="0" err="1"/>
+              <a:t>are</a:t>
+            </a:r>
+            <a:r>
+              <a:rPr lang="nb-NO" dirty="0"/>
+              <a:t> </a:t>
+            </a:r>
+            <a:r>
+              <a:rPr lang="nb-NO" dirty="0" err="1"/>
+              <a:t>also</a:t>
+            </a:r>
+            <a:r>
+              <a:rPr lang="nb-NO" dirty="0"/>
+              <a:t> </a:t>
+            </a:r>
+            <a:r>
+              <a:rPr lang="nb-NO" dirty="0" err="1"/>
+              <a:t>possible</a:t>
+            </a:r>
+            <a:r>
+              <a:rPr lang="nb-NO" dirty="0"/>
+              <a:t> </a:t>
+            </a:r>
+            <a:r>
+              <a:rPr lang="nb-NO" dirty="0" err="1"/>
+              <a:t>of</a:t>
+            </a:r>
+            <a:r>
+              <a:rPr lang="nb-NO" dirty="0"/>
+              <a:t> </a:t>
+            </a:r>
+            <a:r>
+              <a:rPr lang="nb-NO" dirty="0" err="1"/>
+              <a:t>course</a:t>
+            </a:r>
+            <a:r>
+              <a:rPr lang="nb-NO" dirty="0"/>
+              <a:t>, like </a:t>
+            </a:r>
+            <a:r>
+              <a:rPr lang="nb-NO" dirty="0" err="1"/>
+              <a:t>switching</a:t>
+            </a:r>
+            <a:r>
+              <a:rPr lang="nb-NO" dirty="0"/>
+              <a:t> argument order etc.</a:t>
+            </a:r>
+          </a:p>
+        </p:txBody>
+      </p:sp>
+      <p:sp>
+        <p:nvSpPr>
+          <p:cNvPr id="4" name="Plassholder for lysbildenummer 3"/>
+          <p:cNvSpPr>
+            <a:spLocks noGrp="1"/>
+          </p:cNvSpPr>
+          <p:nvPr>
+            <p:ph type="sldNum" sz="quarter" idx="10"/>
+          </p:nvPr>
+        </p:nvSpPr>
+        <p:spPr/>
+        <p:txBody>
+          <a:bodyPr/>
+          <a:lstStyle/>
+          <a:p>
+            <a:fld id="{5DB155C7-787B-4005-9B48-59EDEA8A8FE0}" type="slidenum">
+              <a:rPr lang="nb-NO" smtClean="0"/>
+              <a:t>37</a:t>
+            </a:fld>
+            <a:endParaRPr lang="nb-NO"/>
+          </a:p>
+        </p:txBody>
+      </p:sp>
+    </p:spTree>
+    <p:extLst>
+      <p:ext uri="{BB962C8B-B14F-4D97-AF65-F5344CB8AC3E}">
+        <p14:creationId xmlns:p14="http://schemas.microsoft.com/office/powerpoint/2010/main" val="619705011"/>
+      </p:ext>
+    </p:extLst>
+  </p:cSld>
+  <p:clrMapOvr>
+    <a:masterClrMapping/>
+  </p:clrMapOvr>
+</p:notes>
+</file>
+
+<file path=ppt/notesSlides/notesSlide38.xml><?xml version="1.0" encoding="utf-8"?>
+<p:notes xmlns:a="http://schemas.openxmlformats.org/drawingml/2006/main" xmlns:r="http://schemas.openxmlformats.org/officeDocument/2006/relationships" xmlns:p="http://schemas.openxmlformats.org/presentationml/2006/main">
+  <p:cSld>
+    <p:spTree>
+      <p:nvGrpSpPr>
+        <p:cNvPr id="1" name=""/>
+        <p:cNvGrpSpPr/>
+        <p:nvPr/>
+      </p:nvGrpSpPr>
+      <p:grpSpPr>
+        <a:xfrm>
+          <a:off x="0" y="0"/>
+          <a:ext cx="0" cy="0"/>
+          <a:chOff x="0" y="0"/>
+          <a:chExt cx="0" cy="0"/>
+        </a:xfrm>
+      </p:grpSpPr>
+      <p:sp>
+        <p:nvSpPr>
+          <p:cNvPr id="2" name="Plassholder for lysbilde 1"/>
+          <p:cNvSpPr>
+            <a:spLocks noGrp="1" noRot="1" noChangeAspect="1"/>
+          </p:cNvSpPr>
+          <p:nvPr>
+            <p:ph type="sldImg"/>
+          </p:nvPr>
+        </p:nvSpPr>
+        <p:spPr/>
+      </p:sp>
+      <p:sp>
+        <p:nvSpPr>
+          <p:cNvPr id="3" name="Plassholder for notater 2"/>
+          <p:cNvSpPr>
+            <a:spLocks noGrp="1"/>
+          </p:cNvSpPr>
+          <p:nvPr>
+            <p:ph type="body" idx="1"/>
+          </p:nvPr>
+        </p:nvSpPr>
+        <p:spPr/>
+        <p:txBody>
+          <a:bodyPr/>
+          <a:lstStyle/>
+          <a:p>
+            <a:endParaRPr lang="nb-NO" dirty="0"/>
+          </a:p>
+        </p:txBody>
+      </p:sp>
+      <p:sp>
+        <p:nvSpPr>
+          <p:cNvPr id="4" name="Plassholder for lysbildenummer 3"/>
+          <p:cNvSpPr>
+            <a:spLocks noGrp="1"/>
+          </p:cNvSpPr>
+          <p:nvPr>
+            <p:ph type="sldNum" sz="quarter" idx="10"/>
+          </p:nvPr>
+        </p:nvSpPr>
+        <p:spPr/>
+        <p:txBody>
+          <a:bodyPr/>
+          <a:lstStyle/>
+          <a:p>
+            <a:fld id="{5DB155C7-787B-4005-9B48-59EDEA8A8FE0}" type="slidenum">
+              <a:rPr lang="nb-NO" smtClean="0"/>
+              <a:t>38</a:t>
+            </a:fld>
+            <a:endParaRPr lang="nb-NO"/>
+          </a:p>
+        </p:txBody>
+      </p:sp>
+    </p:spTree>
+    <p:extLst>
+      <p:ext uri="{BB962C8B-B14F-4D97-AF65-F5344CB8AC3E}">
+        <p14:creationId xmlns:p14="http://schemas.microsoft.com/office/powerpoint/2010/main" val="1084450233"/>
+      </p:ext>
+    </p:extLst>
+  </p:cSld>
+  <p:clrMapOvr>
+    <a:masterClrMapping/>
+  </p:clrMapOvr>
+</p:notes>
+</file>
+
+<file path=ppt/notesSlides/notesSlide39.xml><?xml version="1.0" encoding="utf-8"?>
+<p:notes xmlns:a="http://schemas.openxmlformats.org/drawingml/2006/main" xmlns:r="http://schemas.openxmlformats.org/officeDocument/2006/relationships" xmlns:p="http://schemas.openxmlformats.org/presentationml/2006/main">
+  <p:cSld>
+    <p:spTree>
+      <p:nvGrpSpPr>
+        <p:cNvPr id="1" name=""/>
+        <p:cNvGrpSpPr/>
+        <p:nvPr/>
+      </p:nvGrpSpPr>
+      <p:grpSpPr>
+        <a:xfrm>
+          <a:off x="0" y="0"/>
+          <a:ext cx="0" cy="0"/>
+          <a:chOff x="0" y="0"/>
+          <a:chExt cx="0" cy="0"/>
+        </a:xfrm>
+      </p:grpSpPr>
+      <p:sp>
+        <p:nvSpPr>
+          <p:cNvPr id="2" name="Plassholder for lysbilde 1"/>
+          <p:cNvSpPr>
+            <a:spLocks noGrp="1" noRot="1" noChangeAspect="1"/>
+          </p:cNvSpPr>
+          <p:nvPr>
+            <p:ph type="sldImg"/>
+          </p:nvPr>
+        </p:nvSpPr>
+        <p:spPr/>
+      </p:sp>
+      <p:sp>
+        <p:nvSpPr>
+          <p:cNvPr id="3" name="Plassholder for notater 2"/>
+          <p:cNvSpPr>
+            <a:spLocks noGrp="1"/>
+          </p:cNvSpPr>
+          <p:nvPr>
+            <p:ph type="body" idx="1"/>
+          </p:nvPr>
+        </p:nvSpPr>
+        <p:spPr/>
+        <p:txBody>
+          <a:bodyPr/>
+          <a:lstStyle/>
+          <a:p>
+            <a:endParaRPr lang="nb-NO" dirty="0"/>
+          </a:p>
+        </p:txBody>
+      </p:sp>
+      <p:sp>
+        <p:nvSpPr>
+          <p:cNvPr id="4" name="Plassholder for lysbildenummer 3"/>
+          <p:cNvSpPr>
+            <a:spLocks noGrp="1"/>
+          </p:cNvSpPr>
+          <p:nvPr>
+            <p:ph type="sldNum" sz="quarter" idx="10"/>
+          </p:nvPr>
+        </p:nvSpPr>
+        <p:spPr/>
+        <p:txBody>
+          <a:bodyPr/>
+          <a:lstStyle/>
+          <a:p>
+            <a:fld id="{5DB155C7-787B-4005-9B48-59EDEA8A8FE0}" type="slidenum">
+              <a:rPr lang="nb-NO" smtClean="0"/>
+              <a:t>39</a:t>
+            </a:fld>
+            <a:endParaRPr lang="nb-NO"/>
+          </a:p>
+        </p:txBody>
+      </p:sp>
+    </p:spTree>
+    <p:extLst>
+      <p:ext uri="{BB962C8B-B14F-4D97-AF65-F5344CB8AC3E}">
+        <p14:creationId xmlns:p14="http://schemas.microsoft.com/office/powerpoint/2010/main" val="2795814422"/>
       </p:ext>
     </p:extLst>
   </p:cSld>
@@ -4733,7 +4964,16 @@
             </a:r>
             <a:r>
               <a:rPr lang="en-US" dirty="0"/>
-              <a:t> an expert, some of the things covered in the talk may be know to some of you, but hopefully interesting to at least a few of you.</a:t>
+              <a:t> an expert, some of the things covered in the talk may be know to some of you, but hopefully interesting to at least a few of you. </a:t>
+            </a:r>
+          </a:p>
+          <a:p>
+            <a:endParaRPr lang="en-US" dirty="0"/>
+          </a:p>
+          <a:p>
+            <a:r>
+              <a:rPr lang="en-US" dirty="0"/>
+              <a:t>Not claiming any new discoveries here either.</a:t>
             </a:r>
           </a:p>
           <a:p>
@@ -4768,6 +5008,1194 @@
     <p:extLst>
       <p:ext uri="{BB962C8B-B14F-4D97-AF65-F5344CB8AC3E}">
         <p14:creationId xmlns:p14="http://schemas.microsoft.com/office/powerpoint/2010/main" val="3212313172"/>
+      </p:ext>
+    </p:extLst>
+  </p:cSld>
+  <p:clrMapOvr>
+    <a:masterClrMapping/>
+  </p:clrMapOvr>
+</p:notes>
+</file>
+
+<file path=ppt/notesSlides/notesSlide40.xml><?xml version="1.0" encoding="utf-8"?>
+<p:notes xmlns:a="http://schemas.openxmlformats.org/drawingml/2006/main" xmlns:r="http://schemas.openxmlformats.org/officeDocument/2006/relationships" xmlns:p="http://schemas.openxmlformats.org/presentationml/2006/main">
+  <p:cSld>
+    <p:spTree>
+      <p:nvGrpSpPr>
+        <p:cNvPr id="1" name=""/>
+        <p:cNvGrpSpPr/>
+        <p:nvPr/>
+      </p:nvGrpSpPr>
+      <p:grpSpPr>
+        <a:xfrm>
+          <a:off x="0" y="0"/>
+          <a:ext cx="0" cy="0"/>
+          <a:chOff x="0" y="0"/>
+          <a:chExt cx="0" cy="0"/>
+        </a:xfrm>
+      </p:grpSpPr>
+      <p:sp>
+        <p:nvSpPr>
+          <p:cNvPr id="2" name="Plassholder for lysbilde 1"/>
+          <p:cNvSpPr>
+            <a:spLocks noGrp="1" noRot="1" noChangeAspect="1"/>
+          </p:cNvSpPr>
+          <p:nvPr>
+            <p:ph type="sldImg"/>
+          </p:nvPr>
+        </p:nvSpPr>
+        <p:spPr/>
+      </p:sp>
+      <p:sp>
+        <p:nvSpPr>
+          <p:cNvPr id="3" name="Plassholder for notater 2"/>
+          <p:cNvSpPr>
+            <a:spLocks noGrp="1"/>
+          </p:cNvSpPr>
+          <p:nvPr>
+            <p:ph type="body" idx="1"/>
+          </p:nvPr>
+        </p:nvSpPr>
+        <p:spPr/>
+        <p:txBody>
+          <a:bodyPr/>
+          <a:lstStyle/>
+          <a:p>
+            <a:endParaRPr lang="nb-NO" dirty="0"/>
+          </a:p>
+        </p:txBody>
+      </p:sp>
+      <p:sp>
+        <p:nvSpPr>
+          <p:cNvPr id="4" name="Plassholder for lysbildenummer 3"/>
+          <p:cNvSpPr>
+            <a:spLocks noGrp="1"/>
+          </p:cNvSpPr>
+          <p:nvPr>
+            <p:ph type="sldNum" sz="quarter" idx="10"/>
+          </p:nvPr>
+        </p:nvSpPr>
+        <p:spPr/>
+        <p:txBody>
+          <a:bodyPr/>
+          <a:lstStyle/>
+          <a:p>
+            <a:fld id="{5DB155C7-787B-4005-9B48-59EDEA8A8FE0}" type="slidenum">
+              <a:rPr lang="nb-NO" smtClean="0"/>
+              <a:t>40</a:t>
+            </a:fld>
+            <a:endParaRPr lang="nb-NO"/>
+          </a:p>
+        </p:txBody>
+      </p:sp>
+    </p:spTree>
+    <p:extLst>
+      <p:ext uri="{BB962C8B-B14F-4D97-AF65-F5344CB8AC3E}">
+        <p14:creationId xmlns:p14="http://schemas.microsoft.com/office/powerpoint/2010/main" val="1930628358"/>
+      </p:ext>
+    </p:extLst>
+  </p:cSld>
+  <p:clrMapOvr>
+    <a:masterClrMapping/>
+  </p:clrMapOvr>
+</p:notes>
+</file>
+
+<file path=ppt/notesSlides/notesSlide41.xml><?xml version="1.0" encoding="utf-8"?>
+<p:notes xmlns:a="http://schemas.openxmlformats.org/drawingml/2006/main" xmlns:r="http://schemas.openxmlformats.org/officeDocument/2006/relationships" xmlns:p="http://schemas.openxmlformats.org/presentationml/2006/main">
+  <p:cSld>
+    <p:spTree>
+      <p:nvGrpSpPr>
+        <p:cNvPr id="1" name=""/>
+        <p:cNvGrpSpPr/>
+        <p:nvPr/>
+      </p:nvGrpSpPr>
+      <p:grpSpPr>
+        <a:xfrm>
+          <a:off x="0" y="0"/>
+          <a:ext cx="0" cy="0"/>
+          <a:chOff x="0" y="0"/>
+          <a:chExt cx="0" cy="0"/>
+        </a:xfrm>
+      </p:grpSpPr>
+      <p:sp>
+        <p:nvSpPr>
+          <p:cNvPr id="2" name="Plassholder for lysbilde 1"/>
+          <p:cNvSpPr>
+            <a:spLocks noGrp="1" noRot="1" noChangeAspect="1"/>
+          </p:cNvSpPr>
+          <p:nvPr>
+            <p:ph type="sldImg"/>
+          </p:nvPr>
+        </p:nvSpPr>
+        <p:spPr/>
+      </p:sp>
+      <p:sp>
+        <p:nvSpPr>
+          <p:cNvPr id="3" name="Plassholder for notater 2"/>
+          <p:cNvSpPr>
+            <a:spLocks noGrp="1"/>
+          </p:cNvSpPr>
+          <p:nvPr>
+            <p:ph type="body" idx="1"/>
+          </p:nvPr>
+        </p:nvSpPr>
+        <p:spPr/>
+        <p:txBody>
+          <a:bodyPr/>
+          <a:lstStyle/>
+          <a:p>
+            <a:endParaRPr lang="nb-NO" dirty="0"/>
+          </a:p>
+        </p:txBody>
+      </p:sp>
+      <p:sp>
+        <p:nvSpPr>
+          <p:cNvPr id="4" name="Plassholder for lysbildenummer 3"/>
+          <p:cNvSpPr>
+            <a:spLocks noGrp="1"/>
+          </p:cNvSpPr>
+          <p:nvPr>
+            <p:ph type="sldNum" sz="quarter" idx="10"/>
+          </p:nvPr>
+        </p:nvSpPr>
+        <p:spPr/>
+        <p:txBody>
+          <a:bodyPr/>
+          <a:lstStyle/>
+          <a:p>
+            <a:fld id="{5DB155C7-787B-4005-9B48-59EDEA8A8FE0}" type="slidenum">
+              <a:rPr lang="nb-NO" smtClean="0"/>
+              <a:t>41</a:t>
+            </a:fld>
+            <a:endParaRPr lang="nb-NO"/>
+          </a:p>
+        </p:txBody>
+      </p:sp>
+    </p:spTree>
+    <p:extLst>
+      <p:ext uri="{BB962C8B-B14F-4D97-AF65-F5344CB8AC3E}">
+        <p14:creationId xmlns:p14="http://schemas.microsoft.com/office/powerpoint/2010/main" val="1346582364"/>
+      </p:ext>
+    </p:extLst>
+  </p:cSld>
+  <p:clrMapOvr>
+    <a:masterClrMapping/>
+  </p:clrMapOvr>
+</p:notes>
+</file>
+
+<file path=ppt/notesSlides/notesSlide42.xml><?xml version="1.0" encoding="utf-8"?>
+<p:notes xmlns:a="http://schemas.openxmlformats.org/drawingml/2006/main" xmlns:r="http://schemas.openxmlformats.org/officeDocument/2006/relationships" xmlns:p="http://schemas.openxmlformats.org/presentationml/2006/main">
+  <p:cSld>
+    <p:spTree>
+      <p:nvGrpSpPr>
+        <p:cNvPr id="1" name=""/>
+        <p:cNvGrpSpPr/>
+        <p:nvPr/>
+      </p:nvGrpSpPr>
+      <p:grpSpPr>
+        <a:xfrm>
+          <a:off x="0" y="0"/>
+          <a:ext cx="0" cy="0"/>
+          <a:chOff x="0" y="0"/>
+          <a:chExt cx="0" cy="0"/>
+        </a:xfrm>
+      </p:grpSpPr>
+      <p:sp>
+        <p:nvSpPr>
+          <p:cNvPr id="2" name="Plassholder for lysbilde 1"/>
+          <p:cNvSpPr>
+            <a:spLocks noGrp="1" noRot="1" noChangeAspect="1"/>
+          </p:cNvSpPr>
+          <p:nvPr>
+            <p:ph type="sldImg"/>
+          </p:nvPr>
+        </p:nvSpPr>
+        <p:spPr/>
+      </p:sp>
+      <p:sp>
+        <p:nvSpPr>
+          <p:cNvPr id="3" name="Plassholder for notater 2"/>
+          <p:cNvSpPr>
+            <a:spLocks noGrp="1"/>
+          </p:cNvSpPr>
+          <p:nvPr>
+            <p:ph type="body" idx="1"/>
+          </p:nvPr>
+        </p:nvSpPr>
+        <p:spPr/>
+        <p:txBody>
+          <a:bodyPr/>
+          <a:lstStyle/>
+          <a:p>
+            <a:r>
+              <a:rPr lang="nb-NO" dirty="0" err="1"/>
+              <a:t>Example</a:t>
+            </a:r>
+            <a:r>
+              <a:rPr lang="nb-NO" dirty="0"/>
+              <a:t> </a:t>
+            </a:r>
+            <a:r>
+              <a:rPr lang="nb-NO" dirty="0" err="1"/>
+              <a:t>based</a:t>
+            </a:r>
+            <a:r>
+              <a:rPr lang="nb-NO" dirty="0"/>
+              <a:t> </a:t>
+            </a:r>
+            <a:r>
+              <a:rPr lang="nb-NO" dirty="0" err="1"/>
+              <a:t>on</a:t>
+            </a:r>
+            <a:r>
+              <a:rPr lang="nb-NO" dirty="0"/>
+              <a:t> a Google+ </a:t>
+            </a:r>
+            <a:r>
+              <a:rPr lang="nb-NO" dirty="0" err="1"/>
+              <a:t>community</a:t>
+            </a:r>
+            <a:r>
+              <a:rPr lang="nb-NO" dirty="0"/>
+              <a:t> </a:t>
+            </a:r>
+            <a:r>
+              <a:rPr lang="nb-NO" dirty="0" err="1"/>
+              <a:t>user</a:t>
+            </a:r>
+            <a:r>
+              <a:rPr lang="nb-NO" dirty="0"/>
+              <a:t> </a:t>
+            </a:r>
+            <a:r>
+              <a:rPr lang="nb-NO" dirty="0" err="1"/>
+              <a:t>who</a:t>
+            </a:r>
+            <a:r>
+              <a:rPr lang="nb-NO" dirty="0"/>
+              <a:t> </a:t>
+            </a:r>
+            <a:r>
+              <a:rPr lang="nb-NO" dirty="0" err="1"/>
+              <a:t>wanted</a:t>
+            </a:r>
+            <a:r>
+              <a:rPr lang="nb-NO" dirty="0"/>
+              <a:t> to be </a:t>
+            </a:r>
+            <a:r>
+              <a:rPr lang="nb-NO" dirty="0" err="1"/>
+              <a:t>able</a:t>
+            </a:r>
+            <a:r>
+              <a:rPr lang="nb-NO" dirty="0"/>
+              <a:t> to run a SQL </a:t>
+            </a:r>
+            <a:r>
+              <a:rPr lang="nb-NO" dirty="0" err="1"/>
+              <a:t>query</a:t>
+            </a:r>
+            <a:r>
+              <a:rPr lang="nb-NO" dirty="0"/>
+              <a:t> and </a:t>
+            </a:r>
+            <a:r>
+              <a:rPr lang="nb-NO" dirty="0" err="1"/>
+              <a:t>return</a:t>
+            </a:r>
+            <a:r>
+              <a:rPr lang="nb-NO" dirty="0"/>
+              <a:t> </a:t>
+            </a:r>
+            <a:r>
+              <a:rPr lang="nb-NO" dirty="0" err="1"/>
+              <a:t>the</a:t>
+            </a:r>
+            <a:r>
+              <a:rPr lang="nb-NO" dirty="0"/>
+              <a:t> data in an </a:t>
+            </a:r>
+            <a:r>
+              <a:rPr lang="nb-NO" dirty="0" err="1"/>
+              <a:t>array</a:t>
+            </a:r>
+            <a:r>
+              <a:rPr lang="nb-NO" dirty="0"/>
+              <a:t> </a:t>
+            </a:r>
+            <a:r>
+              <a:rPr lang="nb-NO" dirty="0" err="1"/>
+              <a:t>of</a:t>
+            </a:r>
+            <a:r>
+              <a:rPr lang="nb-NO" dirty="0"/>
+              <a:t> variants.</a:t>
+            </a:r>
+          </a:p>
+          <a:p>
+            <a:endParaRPr lang="nb-NO" dirty="0"/>
+          </a:p>
+          <a:p>
+            <a:r>
+              <a:rPr lang="nb-NO" dirty="0"/>
+              <a:t>Note </a:t>
+            </a:r>
+            <a:r>
+              <a:rPr lang="nb-NO" dirty="0" err="1"/>
+              <a:t>that</a:t>
+            </a:r>
+            <a:r>
+              <a:rPr lang="nb-NO" dirty="0"/>
+              <a:t> </a:t>
+            </a:r>
+            <a:r>
+              <a:rPr lang="nb-NO" dirty="0" err="1"/>
+              <a:t>the</a:t>
+            </a:r>
+            <a:r>
+              <a:rPr lang="nb-NO" dirty="0"/>
+              <a:t> </a:t>
+            </a:r>
+            <a:r>
+              <a:rPr lang="nb-NO" dirty="0" err="1"/>
+              <a:t>compiler</a:t>
+            </a:r>
+            <a:r>
+              <a:rPr lang="nb-NO" dirty="0"/>
+              <a:t> </a:t>
+            </a:r>
+            <a:r>
+              <a:rPr lang="nb-NO" dirty="0" err="1"/>
+              <a:t>uses</a:t>
+            </a:r>
+            <a:r>
+              <a:rPr lang="nb-NO" dirty="0"/>
+              <a:t> type </a:t>
+            </a:r>
+            <a:r>
+              <a:rPr lang="nb-NO" dirty="0" err="1"/>
+              <a:t>inference</a:t>
+            </a:r>
+            <a:r>
+              <a:rPr lang="nb-NO" dirty="0"/>
+              <a:t> to </a:t>
+            </a:r>
+            <a:r>
+              <a:rPr lang="nb-NO" dirty="0" err="1"/>
+              <a:t>discover</a:t>
+            </a:r>
+            <a:r>
+              <a:rPr lang="nb-NO" dirty="0"/>
+              <a:t> </a:t>
+            </a:r>
+            <a:r>
+              <a:rPr lang="nb-NO" dirty="0" err="1"/>
+              <a:t>the</a:t>
+            </a:r>
+            <a:r>
+              <a:rPr lang="nb-NO" dirty="0"/>
+              <a:t> </a:t>
+            </a:r>
+            <a:r>
+              <a:rPr lang="nb-NO" dirty="0" err="1"/>
+              <a:t>overload</a:t>
+            </a:r>
+            <a:r>
+              <a:rPr lang="nb-NO" dirty="0"/>
+              <a:t> </a:t>
+            </a:r>
+            <a:r>
+              <a:rPr lang="nb-NO" dirty="0" err="1"/>
+              <a:t>of</a:t>
+            </a:r>
+            <a:r>
+              <a:rPr lang="nb-NO" dirty="0"/>
+              <a:t> </a:t>
+            </a:r>
+            <a:r>
+              <a:rPr lang="nb-NO" dirty="0" err="1"/>
+              <a:t>the</a:t>
+            </a:r>
+            <a:r>
+              <a:rPr lang="nb-NO" dirty="0"/>
+              <a:t> </a:t>
+            </a:r>
+            <a:r>
+              <a:rPr lang="nb-NO" dirty="0" err="1"/>
+              <a:t>implicit</a:t>
+            </a:r>
+            <a:r>
+              <a:rPr lang="nb-NO" dirty="0"/>
+              <a:t> </a:t>
+            </a:r>
+            <a:r>
+              <a:rPr lang="nb-NO" dirty="0" err="1"/>
+              <a:t>conversion</a:t>
+            </a:r>
+            <a:r>
+              <a:rPr lang="nb-NO" dirty="0"/>
+              <a:t> operator.</a:t>
+            </a:r>
+          </a:p>
+        </p:txBody>
+      </p:sp>
+      <p:sp>
+        <p:nvSpPr>
+          <p:cNvPr id="4" name="Plassholder for lysbildenummer 3"/>
+          <p:cNvSpPr>
+            <a:spLocks noGrp="1"/>
+          </p:cNvSpPr>
+          <p:nvPr>
+            <p:ph type="sldNum" sz="quarter" idx="10"/>
+          </p:nvPr>
+        </p:nvSpPr>
+        <p:spPr/>
+        <p:txBody>
+          <a:bodyPr/>
+          <a:lstStyle/>
+          <a:p>
+            <a:fld id="{5DB155C7-787B-4005-9B48-59EDEA8A8FE0}" type="slidenum">
+              <a:rPr lang="nb-NO" smtClean="0"/>
+              <a:t>42</a:t>
+            </a:fld>
+            <a:endParaRPr lang="nb-NO"/>
+          </a:p>
+        </p:txBody>
+      </p:sp>
+    </p:spTree>
+    <p:extLst>
+      <p:ext uri="{BB962C8B-B14F-4D97-AF65-F5344CB8AC3E}">
+        <p14:creationId xmlns:p14="http://schemas.microsoft.com/office/powerpoint/2010/main" val="3040820318"/>
+      </p:ext>
+    </p:extLst>
+  </p:cSld>
+  <p:clrMapOvr>
+    <a:masterClrMapping/>
+  </p:clrMapOvr>
+</p:notes>
+</file>
+
+<file path=ppt/notesSlides/notesSlide43.xml><?xml version="1.0" encoding="utf-8"?>
+<p:notes xmlns:a="http://schemas.openxmlformats.org/drawingml/2006/main" xmlns:r="http://schemas.openxmlformats.org/officeDocument/2006/relationships" xmlns:p="http://schemas.openxmlformats.org/presentationml/2006/main">
+  <p:cSld>
+    <p:spTree>
+      <p:nvGrpSpPr>
+        <p:cNvPr id="1" name=""/>
+        <p:cNvGrpSpPr/>
+        <p:nvPr/>
+      </p:nvGrpSpPr>
+      <p:grpSpPr>
+        <a:xfrm>
+          <a:off x="0" y="0"/>
+          <a:ext cx="0" cy="0"/>
+          <a:chOff x="0" y="0"/>
+          <a:chExt cx="0" cy="0"/>
+        </a:xfrm>
+      </p:grpSpPr>
+      <p:sp>
+        <p:nvSpPr>
+          <p:cNvPr id="2" name="Plassholder for lysbilde 1"/>
+          <p:cNvSpPr>
+            <a:spLocks noGrp="1" noRot="1" noChangeAspect="1"/>
+          </p:cNvSpPr>
+          <p:nvPr>
+            <p:ph type="sldImg"/>
+          </p:nvPr>
+        </p:nvSpPr>
+        <p:spPr/>
+      </p:sp>
+      <p:sp>
+        <p:nvSpPr>
+          <p:cNvPr id="3" name="Plassholder for notater 2"/>
+          <p:cNvSpPr>
+            <a:spLocks noGrp="1"/>
+          </p:cNvSpPr>
+          <p:nvPr>
+            <p:ph type="body" idx="1"/>
+          </p:nvPr>
+        </p:nvSpPr>
+        <p:spPr/>
+        <p:txBody>
+          <a:bodyPr/>
+          <a:lstStyle/>
+          <a:p>
+            <a:r>
+              <a:rPr lang="nb-NO" dirty="0"/>
+              <a:t>Channel </a:t>
+            </a:r>
+            <a:r>
+              <a:rPr lang="nb-NO" dirty="0" err="1"/>
+              <a:t>example</a:t>
+            </a:r>
+            <a:r>
+              <a:rPr lang="nb-NO" dirty="0"/>
+              <a:t> </a:t>
+            </a:r>
+            <a:r>
+              <a:rPr lang="nb-NO" dirty="0" err="1"/>
+              <a:t>inspired</a:t>
+            </a:r>
+            <a:r>
+              <a:rPr lang="nb-NO" dirty="0"/>
+              <a:t> by Go </a:t>
+            </a:r>
+            <a:r>
+              <a:rPr lang="nb-NO" dirty="0" err="1"/>
+              <a:t>channels</a:t>
+            </a:r>
+            <a:r>
+              <a:rPr lang="nb-NO" dirty="0"/>
+              <a:t>.</a:t>
+            </a:r>
+          </a:p>
+          <a:p>
+            <a:endParaRPr lang="nb-NO" dirty="0"/>
+          </a:p>
+          <a:p>
+            <a:r>
+              <a:rPr lang="nb-NO" dirty="0" err="1"/>
+              <a:t>Also</a:t>
+            </a:r>
+            <a:r>
+              <a:rPr lang="nb-NO" dirty="0"/>
+              <a:t> showcases record </a:t>
+            </a:r>
+            <a:r>
+              <a:rPr lang="nb-NO" dirty="0" err="1"/>
+              <a:t>delegating</a:t>
+            </a:r>
+            <a:r>
+              <a:rPr lang="nb-NO" dirty="0"/>
+              <a:t> to </a:t>
+            </a:r>
+            <a:r>
+              <a:rPr lang="nb-NO" dirty="0" err="1"/>
+              <a:t>interface</a:t>
+            </a:r>
+            <a:r>
+              <a:rPr lang="nb-NO" dirty="0"/>
+              <a:t> for </a:t>
+            </a:r>
+            <a:r>
+              <a:rPr lang="nb-NO" dirty="0" err="1"/>
+              <a:t>reference</a:t>
+            </a:r>
+            <a:r>
+              <a:rPr lang="nb-NO" dirty="0"/>
+              <a:t> </a:t>
+            </a:r>
+            <a:r>
+              <a:rPr lang="nb-NO" dirty="0" err="1"/>
+              <a:t>semantics</a:t>
+            </a:r>
+            <a:r>
+              <a:rPr lang="nb-NO" dirty="0"/>
+              <a:t>.</a:t>
+            </a:r>
+          </a:p>
+        </p:txBody>
+      </p:sp>
+      <p:sp>
+        <p:nvSpPr>
+          <p:cNvPr id="4" name="Plassholder for lysbildenummer 3"/>
+          <p:cNvSpPr>
+            <a:spLocks noGrp="1"/>
+          </p:cNvSpPr>
+          <p:nvPr>
+            <p:ph type="sldNum" sz="quarter" idx="10"/>
+          </p:nvPr>
+        </p:nvSpPr>
+        <p:spPr/>
+        <p:txBody>
+          <a:bodyPr/>
+          <a:lstStyle/>
+          <a:p>
+            <a:fld id="{5DB155C7-787B-4005-9B48-59EDEA8A8FE0}" type="slidenum">
+              <a:rPr lang="nb-NO" smtClean="0"/>
+              <a:t>43</a:t>
+            </a:fld>
+            <a:endParaRPr lang="nb-NO"/>
+          </a:p>
+        </p:txBody>
+      </p:sp>
+    </p:spTree>
+    <p:extLst>
+      <p:ext uri="{BB962C8B-B14F-4D97-AF65-F5344CB8AC3E}">
+        <p14:creationId xmlns:p14="http://schemas.microsoft.com/office/powerpoint/2010/main" val="3542102874"/>
+      </p:ext>
+    </p:extLst>
+  </p:cSld>
+  <p:clrMapOvr>
+    <a:masterClrMapping/>
+  </p:clrMapOvr>
+</p:notes>
+</file>
+
+<file path=ppt/notesSlides/notesSlide44.xml><?xml version="1.0" encoding="utf-8"?>
+<p:notes xmlns:a="http://schemas.openxmlformats.org/drawingml/2006/main" xmlns:r="http://schemas.openxmlformats.org/officeDocument/2006/relationships" xmlns:p="http://schemas.openxmlformats.org/presentationml/2006/main">
+  <p:cSld>
+    <p:spTree>
+      <p:nvGrpSpPr>
+        <p:cNvPr id="1" name=""/>
+        <p:cNvGrpSpPr/>
+        <p:nvPr/>
+      </p:nvGrpSpPr>
+      <p:grpSpPr>
+        <a:xfrm>
+          <a:off x="0" y="0"/>
+          <a:ext cx="0" cy="0"/>
+          <a:chOff x="0" y="0"/>
+          <a:chExt cx="0" cy="0"/>
+        </a:xfrm>
+      </p:grpSpPr>
+      <p:sp>
+        <p:nvSpPr>
+          <p:cNvPr id="2" name="Plassholder for lysbilde 1"/>
+          <p:cNvSpPr>
+            <a:spLocks noGrp="1" noRot="1" noChangeAspect="1"/>
+          </p:cNvSpPr>
+          <p:nvPr>
+            <p:ph type="sldImg"/>
+          </p:nvPr>
+        </p:nvSpPr>
+        <p:spPr/>
+      </p:sp>
+      <p:sp>
+        <p:nvSpPr>
+          <p:cNvPr id="3" name="Plassholder for notater 2"/>
+          <p:cNvSpPr>
+            <a:spLocks noGrp="1"/>
+          </p:cNvSpPr>
+          <p:nvPr>
+            <p:ph type="body" idx="1"/>
+          </p:nvPr>
+        </p:nvSpPr>
+        <p:spPr/>
+        <p:txBody>
+          <a:bodyPr/>
+          <a:lstStyle/>
+          <a:p>
+            <a:endParaRPr lang="nb-NO" dirty="0"/>
+          </a:p>
+        </p:txBody>
+      </p:sp>
+      <p:sp>
+        <p:nvSpPr>
+          <p:cNvPr id="4" name="Plassholder for lysbildenummer 3"/>
+          <p:cNvSpPr>
+            <a:spLocks noGrp="1"/>
+          </p:cNvSpPr>
+          <p:nvPr>
+            <p:ph type="sldNum" sz="quarter" idx="10"/>
+          </p:nvPr>
+        </p:nvSpPr>
+        <p:spPr/>
+        <p:txBody>
+          <a:bodyPr/>
+          <a:lstStyle/>
+          <a:p>
+            <a:fld id="{5DB155C7-787B-4005-9B48-59EDEA8A8FE0}" type="slidenum">
+              <a:rPr lang="nb-NO" smtClean="0"/>
+              <a:t>44</a:t>
+            </a:fld>
+            <a:endParaRPr lang="nb-NO"/>
+          </a:p>
+        </p:txBody>
+      </p:sp>
+    </p:spTree>
+    <p:extLst>
+      <p:ext uri="{BB962C8B-B14F-4D97-AF65-F5344CB8AC3E}">
+        <p14:creationId xmlns:p14="http://schemas.microsoft.com/office/powerpoint/2010/main" val="4285391064"/>
+      </p:ext>
+    </p:extLst>
+  </p:cSld>
+  <p:clrMapOvr>
+    <a:masterClrMapping/>
+  </p:clrMapOvr>
+</p:notes>
+</file>
+
+<file path=ppt/notesSlides/notesSlide45.xml><?xml version="1.0" encoding="utf-8"?>
+<p:notes xmlns:a="http://schemas.openxmlformats.org/drawingml/2006/main" xmlns:r="http://schemas.openxmlformats.org/officeDocument/2006/relationships" xmlns:p="http://schemas.openxmlformats.org/presentationml/2006/main">
+  <p:cSld>
+    <p:spTree>
+      <p:nvGrpSpPr>
+        <p:cNvPr id="1" name=""/>
+        <p:cNvGrpSpPr/>
+        <p:nvPr/>
+      </p:nvGrpSpPr>
+      <p:grpSpPr>
+        <a:xfrm>
+          <a:off x="0" y="0"/>
+          <a:ext cx="0" cy="0"/>
+          <a:chOff x="0" y="0"/>
+          <a:chExt cx="0" cy="0"/>
+        </a:xfrm>
+      </p:grpSpPr>
+      <p:sp>
+        <p:nvSpPr>
+          <p:cNvPr id="2" name="Plassholder for lysbilde 1"/>
+          <p:cNvSpPr>
+            <a:spLocks noGrp="1" noRot="1" noChangeAspect="1"/>
+          </p:cNvSpPr>
+          <p:nvPr>
+            <p:ph type="sldImg"/>
+          </p:nvPr>
+        </p:nvSpPr>
+        <p:spPr/>
+      </p:sp>
+      <p:sp>
+        <p:nvSpPr>
+          <p:cNvPr id="3" name="Plassholder for notater 2"/>
+          <p:cNvSpPr>
+            <a:spLocks noGrp="1"/>
+          </p:cNvSpPr>
+          <p:nvPr>
+            <p:ph type="body" idx="1"/>
+          </p:nvPr>
+        </p:nvSpPr>
+        <p:spPr/>
+        <p:txBody>
+          <a:bodyPr/>
+          <a:lstStyle/>
+          <a:p>
+            <a:r>
+              <a:rPr lang="en-US" dirty="0"/>
+              <a:t>The overloaded less-or-equal operator returns false once the channel is closed, and writes the value from the channel into the left-hand operand.</a:t>
+            </a:r>
+          </a:p>
+        </p:txBody>
+      </p:sp>
+      <p:sp>
+        <p:nvSpPr>
+          <p:cNvPr id="4" name="Plassholder for lysbildenummer 3"/>
+          <p:cNvSpPr>
+            <a:spLocks noGrp="1"/>
+          </p:cNvSpPr>
+          <p:nvPr>
+            <p:ph type="sldNum" sz="quarter" idx="10"/>
+          </p:nvPr>
+        </p:nvSpPr>
+        <p:spPr/>
+        <p:txBody>
+          <a:bodyPr/>
+          <a:lstStyle/>
+          <a:p>
+            <a:fld id="{5DB155C7-787B-4005-9B48-59EDEA8A8FE0}" type="slidenum">
+              <a:rPr lang="nb-NO" smtClean="0"/>
+              <a:t>45</a:t>
+            </a:fld>
+            <a:endParaRPr lang="nb-NO"/>
+          </a:p>
+        </p:txBody>
+      </p:sp>
+    </p:spTree>
+    <p:extLst>
+      <p:ext uri="{BB962C8B-B14F-4D97-AF65-F5344CB8AC3E}">
+        <p14:creationId xmlns:p14="http://schemas.microsoft.com/office/powerpoint/2010/main" val="1112766777"/>
+      </p:ext>
+    </p:extLst>
+  </p:cSld>
+  <p:clrMapOvr>
+    <a:masterClrMapping/>
+  </p:clrMapOvr>
+</p:notes>
+</file>
+
+<file path=ppt/notesSlides/notesSlide46.xml><?xml version="1.0" encoding="utf-8"?>
+<p:notes xmlns:a="http://schemas.openxmlformats.org/drawingml/2006/main" xmlns:r="http://schemas.openxmlformats.org/officeDocument/2006/relationships" xmlns:p="http://schemas.openxmlformats.org/presentationml/2006/main">
+  <p:cSld>
+    <p:spTree>
+      <p:nvGrpSpPr>
+        <p:cNvPr id="1" name=""/>
+        <p:cNvGrpSpPr/>
+        <p:nvPr/>
+      </p:nvGrpSpPr>
+      <p:grpSpPr>
+        <a:xfrm>
+          <a:off x="0" y="0"/>
+          <a:ext cx="0" cy="0"/>
+          <a:chOff x="0" y="0"/>
+          <a:chExt cx="0" cy="0"/>
+        </a:xfrm>
+      </p:grpSpPr>
+      <p:sp>
+        <p:nvSpPr>
+          <p:cNvPr id="2" name="Plassholder for lysbilde 1"/>
+          <p:cNvSpPr>
+            <a:spLocks noGrp="1" noRot="1" noChangeAspect="1"/>
+          </p:cNvSpPr>
+          <p:nvPr>
+            <p:ph type="sldImg"/>
+          </p:nvPr>
+        </p:nvSpPr>
+        <p:spPr/>
+      </p:sp>
+      <p:sp>
+        <p:nvSpPr>
+          <p:cNvPr id="3" name="Plassholder for notater 2"/>
+          <p:cNvSpPr>
+            <a:spLocks noGrp="1"/>
+          </p:cNvSpPr>
+          <p:nvPr>
+            <p:ph type="body" idx="1"/>
+          </p:nvPr>
+        </p:nvSpPr>
+        <p:spPr/>
+        <p:txBody>
+          <a:bodyPr/>
+          <a:lstStyle/>
+          <a:p>
+            <a:r>
+              <a:rPr lang="nb-NO" dirty="0" err="1"/>
+              <a:t>Builds</a:t>
+            </a:r>
+            <a:r>
+              <a:rPr lang="nb-NO" dirty="0"/>
+              <a:t> an </a:t>
+            </a:r>
+            <a:r>
+              <a:rPr lang="nb-NO" dirty="0" err="1"/>
+              <a:t>expression</a:t>
+            </a:r>
+            <a:r>
+              <a:rPr lang="nb-NO" dirty="0"/>
+              <a:t> </a:t>
+            </a:r>
+            <a:r>
+              <a:rPr lang="nb-NO" dirty="0" err="1"/>
+              <a:t>tree</a:t>
+            </a:r>
+            <a:r>
+              <a:rPr lang="nb-NO" dirty="0"/>
+              <a:t>, </a:t>
+            </a:r>
+            <a:r>
+              <a:rPr lang="nb-NO" dirty="0" err="1"/>
+              <a:t>stored</a:t>
+            </a:r>
+            <a:r>
+              <a:rPr lang="nb-NO" dirty="0"/>
+              <a:t> in P10. The Transform() </a:t>
+            </a:r>
+            <a:r>
+              <a:rPr lang="nb-NO" dirty="0" err="1"/>
+              <a:t>function</a:t>
+            </a:r>
+            <a:r>
+              <a:rPr lang="nb-NO" dirty="0"/>
+              <a:t> </a:t>
+            </a:r>
+            <a:r>
+              <a:rPr lang="nb-NO" dirty="0" err="1"/>
+              <a:t>transforms</a:t>
+            </a:r>
+            <a:r>
+              <a:rPr lang="nb-NO" dirty="0"/>
+              <a:t> </a:t>
+            </a:r>
+            <a:r>
+              <a:rPr lang="nb-NO" dirty="0" err="1"/>
+              <a:t>each</a:t>
+            </a:r>
+            <a:r>
+              <a:rPr lang="nb-NO" dirty="0"/>
+              <a:t> element in </a:t>
+            </a:r>
+            <a:r>
+              <a:rPr lang="nb-NO" dirty="0" err="1"/>
+              <a:t>the</a:t>
+            </a:r>
+            <a:r>
+              <a:rPr lang="nb-NO" dirty="0"/>
+              <a:t> input </a:t>
+            </a:r>
+            <a:r>
+              <a:rPr lang="nb-NO" dirty="0" err="1"/>
+              <a:t>array</a:t>
+            </a:r>
+            <a:r>
+              <a:rPr lang="nb-NO" dirty="0"/>
+              <a:t> by </a:t>
+            </a:r>
+            <a:r>
+              <a:rPr lang="nb-NO" dirty="0" err="1"/>
+              <a:t>the</a:t>
+            </a:r>
+            <a:r>
+              <a:rPr lang="nb-NO" dirty="0"/>
+              <a:t> </a:t>
+            </a:r>
+            <a:r>
+              <a:rPr lang="nb-NO" dirty="0" err="1"/>
+              <a:t>supplied</a:t>
+            </a:r>
+            <a:r>
+              <a:rPr lang="nb-NO" dirty="0"/>
+              <a:t> </a:t>
+            </a:r>
+            <a:r>
+              <a:rPr lang="nb-NO" dirty="0" err="1"/>
+              <a:t>expression</a:t>
+            </a:r>
+            <a:r>
+              <a:rPr lang="nb-NO" dirty="0"/>
+              <a:t>. </a:t>
+            </a:r>
+          </a:p>
+          <a:p>
+            <a:endParaRPr lang="nb-NO" dirty="0"/>
+          </a:p>
+          <a:p>
+            <a:r>
+              <a:rPr lang="nb-NO" dirty="0"/>
+              <a:t>It </a:t>
+            </a:r>
+            <a:r>
+              <a:rPr lang="nb-NO" dirty="0" err="1"/>
+              <a:t>takes</a:t>
+            </a:r>
+            <a:r>
+              <a:rPr lang="nb-NO" dirty="0"/>
+              <a:t> </a:t>
+            </a:r>
+            <a:r>
+              <a:rPr lang="nb-NO" dirty="0" err="1"/>
+              <a:t>the</a:t>
+            </a:r>
+            <a:r>
+              <a:rPr lang="nb-NO" dirty="0"/>
+              <a:t> </a:t>
+            </a:r>
+            <a:r>
+              <a:rPr lang="nb-NO" dirty="0" err="1"/>
+              <a:t>expression</a:t>
+            </a:r>
+            <a:r>
+              <a:rPr lang="nb-NO" dirty="0"/>
+              <a:t>, </a:t>
+            </a:r>
+            <a:r>
+              <a:rPr lang="nb-NO" dirty="0" err="1"/>
+              <a:t>generates</a:t>
+            </a:r>
+            <a:r>
+              <a:rPr lang="nb-NO" dirty="0"/>
+              <a:t> </a:t>
+            </a:r>
+            <a:r>
+              <a:rPr lang="nb-NO" dirty="0" err="1"/>
+              <a:t>OpenCL</a:t>
+            </a:r>
+            <a:r>
+              <a:rPr lang="nb-NO" dirty="0"/>
+              <a:t> </a:t>
+            </a:r>
+            <a:r>
+              <a:rPr lang="nb-NO" dirty="0" err="1"/>
+              <a:t>code</a:t>
+            </a:r>
+            <a:r>
+              <a:rPr lang="nb-NO" dirty="0"/>
+              <a:t> on-</a:t>
+            </a:r>
+            <a:r>
+              <a:rPr lang="nb-NO" dirty="0" err="1"/>
+              <a:t>the</a:t>
+            </a:r>
+            <a:r>
+              <a:rPr lang="nb-NO" dirty="0"/>
+              <a:t>-fly, </a:t>
+            </a:r>
+            <a:r>
+              <a:rPr lang="nb-NO" dirty="0" err="1"/>
+              <a:t>executes</a:t>
+            </a:r>
+            <a:r>
+              <a:rPr lang="nb-NO" dirty="0"/>
+              <a:t> it </a:t>
+            </a:r>
+            <a:r>
+              <a:rPr lang="nb-NO" dirty="0" err="1"/>
+              <a:t>on</a:t>
+            </a:r>
+            <a:r>
+              <a:rPr lang="nb-NO" dirty="0"/>
+              <a:t> </a:t>
+            </a:r>
+            <a:r>
+              <a:rPr lang="nb-NO" dirty="0" err="1"/>
+              <a:t>the</a:t>
+            </a:r>
+            <a:r>
+              <a:rPr lang="nb-NO" dirty="0"/>
+              <a:t> GPU and </a:t>
+            </a:r>
+            <a:r>
+              <a:rPr lang="nb-NO" dirty="0" err="1"/>
+              <a:t>downloads</a:t>
+            </a:r>
+            <a:r>
+              <a:rPr lang="nb-NO" dirty="0"/>
+              <a:t> </a:t>
+            </a:r>
+            <a:r>
+              <a:rPr lang="nb-NO" dirty="0" err="1"/>
+              <a:t>the</a:t>
+            </a:r>
+            <a:r>
+              <a:rPr lang="nb-NO" dirty="0"/>
+              <a:t> result.</a:t>
+            </a:r>
+          </a:p>
+          <a:p>
+            <a:endParaRPr lang="nb-NO" dirty="0"/>
+          </a:p>
+          <a:p>
+            <a:r>
+              <a:rPr lang="nb-NO" dirty="0"/>
+              <a:t>The _1 placeholder is used to represent </a:t>
+            </a:r>
+            <a:r>
+              <a:rPr lang="nb-NO" dirty="0" err="1"/>
+              <a:t>the</a:t>
+            </a:r>
+            <a:r>
+              <a:rPr lang="nb-NO" dirty="0"/>
+              <a:t> </a:t>
+            </a:r>
+            <a:r>
+              <a:rPr lang="nb-NO" dirty="0" err="1"/>
+              <a:t>current</a:t>
+            </a:r>
+            <a:r>
+              <a:rPr lang="nb-NO" dirty="0"/>
+              <a:t> </a:t>
+            </a:r>
+            <a:r>
+              <a:rPr lang="nb-NO" dirty="0" err="1"/>
+              <a:t>array</a:t>
+            </a:r>
+            <a:r>
+              <a:rPr lang="nb-NO" dirty="0"/>
+              <a:t> element.</a:t>
+            </a:r>
+          </a:p>
+        </p:txBody>
+      </p:sp>
+      <p:sp>
+        <p:nvSpPr>
+          <p:cNvPr id="4" name="Plassholder for lysbildenummer 3"/>
+          <p:cNvSpPr>
+            <a:spLocks noGrp="1"/>
+          </p:cNvSpPr>
+          <p:nvPr>
+            <p:ph type="sldNum" sz="quarter" idx="10"/>
+          </p:nvPr>
+        </p:nvSpPr>
+        <p:spPr/>
+        <p:txBody>
+          <a:bodyPr/>
+          <a:lstStyle/>
+          <a:p>
+            <a:fld id="{5DB155C7-787B-4005-9B48-59EDEA8A8FE0}" type="slidenum">
+              <a:rPr lang="nb-NO" smtClean="0"/>
+              <a:t>46</a:t>
+            </a:fld>
+            <a:endParaRPr lang="nb-NO"/>
+          </a:p>
+        </p:txBody>
+      </p:sp>
+    </p:spTree>
+    <p:extLst>
+      <p:ext uri="{BB962C8B-B14F-4D97-AF65-F5344CB8AC3E}">
+        <p14:creationId xmlns:p14="http://schemas.microsoft.com/office/powerpoint/2010/main" val="4205728534"/>
+      </p:ext>
+    </p:extLst>
+  </p:cSld>
+  <p:clrMapOvr>
+    <a:masterClrMapping/>
+  </p:clrMapOvr>
+</p:notes>
+</file>
+
+<file path=ppt/notesSlides/notesSlide47.xml><?xml version="1.0" encoding="utf-8"?>
+<p:notes xmlns:a="http://schemas.openxmlformats.org/drawingml/2006/main" xmlns:r="http://schemas.openxmlformats.org/officeDocument/2006/relationships" xmlns:p="http://schemas.openxmlformats.org/presentationml/2006/main">
+  <p:cSld>
+    <p:spTree>
+      <p:nvGrpSpPr>
+        <p:cNvPr id="1" name=""/>
+        <p:cNvGrpSpPr/>
+        <p:nvPr/>
+      </p:nvGrpSpPr>
+      <p:grpSpPr>
+        <a:xfrm>
+          <a:off x="0" y="0"/>
+          <a:ext cx="0" cy="0"/>
+          <a:chOff x="0" y="0"/>
+          <a:chExt cx="0" cy="0"/>
+        </a:xfrm>
+      </p:grpSpPr>
+      <p:sp>
+        <p:nvSpPr>
+          <p:cNvPr id="2" name="Plassholder for lysbilde 1"/>
+          <p:cNvSpPr>
+            <a:spLocks noGrp="1" noRot="1" noChangeAspect="1"/>
+          </p:cNvSpPr>
+          <p:nvPr>
+            <p:ph type="sldImg"/>
+          </p:nvPr>
+        </p:nvSpPr>
+        <p:spPr/>
+      </p:sp>
+      <p:sp>
+        <p:nvSpPr>
+          <p:cNvPr id="3" name="Plassholder for notater 2"/>
+          <p:cNvSpPr>
+            <a:spLocks noGrp="1"/>
+          </p:cNvSpPr>
+          <p:nvPr>
+            <p:ph type="body" idx="1"/>
+          </p:nvPr>
+        </p:nvSpPr>
+        <p:spPr/>
+        <p:txBody>
+          <a:bodyPr/>
+          <a:lstStyle/>
+          <a:p>
+            <a:endParaRPr lang="nb-NO"/>
+          </a:p>
+        </p:txBody>
+      </p:sp>
+      <p:sp>
+        <p:nvSpPr>
+          <p:cNvPr id="4" name="Plassholder for lysbildenummer 3"/>
+          <p:cNvSpPr>
+            <a:spLocks noGrp="1"/>
+          </p:cNvSpPr>
+          <p:nvPr>
+            <p:ph type="sldNum" sz="quarter" idx="10"/>
+          </p:nvPr>
+        </p:nvSpPr>
+        <p:spPr/>
+        <p:txBody>
+          <a:bodyPr/>
+          <a:lstStyle/>
+          <a:p>
+            <a:fld id="{5DB155C7-787B-4005-9B48-59EDEA8A8FE0}" type="slidenum">
+              <a:rPr lang="nb-NO" smtClean="0"/>
+              <a:t>47</a:t>
+            </a:fld>
+            <a:endParaRPr lang="nb-NO"/>
+          </a:p>
+        </p:txBody>
+      </p:sp>
+    </p:spTree>
+    <p:extLst>
+      <p:ext uri="{BB962C8B-B14F-4D97-AF65-F5344CB8AC3E}">
+        <p14:creationId xmlns:p14="http://schemas.microsoft.com/office/powerpoint/2010/main" val="1009888299"/>
       </p:ext>
     </p:extLst>
   </p:cSld>
@@ -4821,19 +6249,7 @@
           <a:bodyPr/>
           <a:lstStyle/>
           <a:p>
-            <a:r>
-              <a:rPr lang="en-US" dirty="0"/>
-              <a:t>Use as namespace is useful for generics.</a:t>
-            </a:r>
-          </a:p>
-          <a:p>
-            <a:endParaRPr lang="en-US" dirty="0"/>
-          </a:p>
-          <a:p>
-            <a:r>
-              <a:rPr lang="en-US" dirty="0"/>
-              <a:t>Use public/private as separator between nested type section and regular fields/methods, due to compiler issues.</a:t>
-            </a:r>
+            <a:endParaRPr lang="nb-NO"/>
           </a:p>
         </p:txBody>
       </p:sp>
@@ -4854,7 +6270,7 @@
           <a:p>
             <a:fld id="{5DB155C7-787B-4005-9B48-59EDEA8A8FE0}" type="slidenum">
               <a:rPr lang="nb-NO" smtClean="0"/>
-              <a:t>6</a:t>
+              <a:t>5</a:t>
             </a:fld>
             <a:endParaRPr lang="nb-NO"/>
           </a:p>
@@ -4863,7 +6279,7 @@
     </p:spTree>
     <p:extLst>
       <p:ext uri="{BB962C8B-B14F-4D97-AF65-F5344CB8AC3E}">
-        <p14:creationId xmlns:p14="http://schemas.microsoft.com/office/powerpoint/2010/main" val="2946765087"/>
+        <p14:creationId xmlns:p14="http://schemas.microsoft.com/office/powerpoint/2010/main" val="1138671728"/>
       </p:ext>
     </p:extLst>
   </p:cSld>
@@ -4919,7 +6335,7 @@
           <a:p>
             <a:r>
               <a:rPr lang="en-US" dirty="0"/>
-              <a:t>Also known as closures. </a:t>
+              <a:t>Use as namespace is useful for generics.</a:t>
             </a:r>
           </a:p>
           <a:p>
@@ -4928,45 +6344,7 @@
           <a:p>
             <a:r>
               <a:rPr lang="en-US" dirty="0"/>
-              <a:t>Two parts:</a:t>
-            </a:r>
-          </a:p>
-          <a:p>
-            <a:pPr marL="171450" indent="-171450">
-              <a:buFontTx/>
-              <a:buChar char="-"/>
-            </a:pPr>
-            <a:r>
-              <a:rPr lang="en-US" dirty="0"/>
-              <a:t>a method reference</a:t>
-            </a:r>
-          </a:p>
-          <a:p>
-            <a:pPr marL="171450" indent="-171450">
-              <a:buFontTx/>
-              <a:buChar char="-"/>
-            </a:pPr>
-            <a:r>
-              <a:rPr lang="en-US" dirty="0"/>
-              <a:t>the anonymous method declaration</a:t>
-            </a:r>
-          </a:p>
-          <a:p>
-            <a:endParaRPr lang="en-US" dirty="0"/>
-          </a:p>
-          <a:p>
-            <a:r>
-              <a:rPr lang="en-US" dirty="0"/>
-              <a:t>Method references can reference free functions, regular methods and anonymous methods.</a:t>
-            </a:r>
-          </a:p>
-          <a:p>
-            <a:endParaRPr lang="en-US" dirty="0"/>
-          </a:p>
-          <a:p>
-            <a:r>
-              <a:rPr lang="en-US" dirty="0"/>
-              <a:t>Function parameters are captured as if they were regular local variables.</a:t>
+              <a:t>Use public/private as separator between nested type section and regular fields/methods, due to compiler issues.</a:t>
             </a:r>
           </a:p>
         </p:txBody>
@@ -4988,7 +6366,7 @@
           <a:p>
             <a:fld id="{5DB155C7-787B-4005-9B48-59EDEA8A8FE0}" type="slidenum">
               <a:rPr lang="nb-NO" smtClean="0"/>
-              <a:t>8</a:t>
+              <a:t>6</a:t>
             </a:fld>
             <a:endParaRPr lang="nb-NO"/>
           </a:p>
@@ -4997,7 +6375,7 @@
     </p:spTree>
     <p:extLst>
       <p:ext uri="{BB962C8B-B14F-4D97-AF65-F5344CB8AC3E}">
-        <p14:creationId xmlns:p14="http://schemas.microsoft.com/office/powerpoint/2010/main" val="3173072931"/>
+        <p14:creationId xmlns:p14="http://schemas.microsoft.com/office/powerpoint/2010/main" val="2946765087"/>
       </p:ext>
     </p:extLst>
   </p:cSld>
@@ -5051,27 +6429,7 @@
           <a:bodyPr/>
           <a:lstStyle/>
           <a:p>
-            <a:r>
-              <a:rPr lang="en-US" dirty="0"/>
-              <a:t>Anonymous methods are reference counted, which can cause lifetime management issues if it captures reference counted resources.</a:t>
-            </a:r>
-          </a:p>
-          <a:p>
-            <a:endParaRPr lang="en-US" dirty="0"/>
-          </a:p>
-          <a:p>
-            <a:r>
-              <a:rPr lang="en-US" dirty="0"/>
-              <a:t>In the example, </a:t>
-            </a:r>
-            <a:r>
-              <a:rPr lang="en-US" dirty="0" err="1"/>
-              <a:t>i</a:t>
-            </a:r>
-            <a:r>
-              <a:rPr lang="en-US" dirty="0"/>
-              <a:t> is captured and stored as a member of the object implementing the anonymous method.</a:t>
-            </a:r>
+            <a:endParaRPr lang="nb-NO"/>
           </a:p>
         </p:txBody>
       </p:sp>
@@ -5092,7 +6450,7 @@
           <a:p>
             <a:fld id="{5DB155C7-787B-4005-9B48-59EDEA8A8FE0}" type="slidenum">
               <a:rPr lang="nb-NO" smtClean="0"/>
-              <a:t>9</a:t>
+              <a:t>7</a:t>
             </a:fld>
             <a:endParaRPr lang="nb-NO"/>
           </a:p>
@@ -5101,7 +6459,7 @@
     </p:spTree>
     <p:extLst>
       <p:ext uri="{BB962C8B-B14F-4D97-AF65-F5344CB8AC3E}">
-        <p14:creationId xmlns:p14="http://schemas.microsoft.com/office/powerpoint/2010/main" val="2887672922"/>
+        <p14:creationId xmlns:p14="http://schemas.microsoft.com/office/powerpoint/2010/main" val="2312819671"/>
       </p:ext>
     </p:extLst>
   </p:cSld>
@@ -5155,10 +6513,57 @@
           <a:bodyPr/>
           <a:lstStyle/>
           <a:p>
-            <a:endParaRPr lang="nb-NO" dirty="0"/>
-          </a:p>
-          <a:p>
-            <a:endParaRPr lang="nb-NO" dirty="0"/>
+            <a:r>
+              <a:rPr lang="en-US" dirty="0"/>
+              <a:t>Also known as closures. </a:t>
+            </a:r>
+          </a:p>
+          <a:p>
+            <a:endParaRPr lang="en-US" dirty="0"/>
+          </a:p>
+          <a:p>
+            <a:r>
+              <a:rPr lang="en-US" dirty="0"/>
+              <a:t>Two parts:</a:t>
+            </a:r>
+          </a:p>
+          <a:p>
+            <a:pPr marL="171450" indent="-171450">
+              <a:buFontTx/>
+              <a:buChar char="-"/>
+            </a:pPr>
+            <a:r>
+              <a:rPr lang="en-US" dirty="0"/>
+              <a:t>a method reference</a:t>
+            </a:r>
+          </a:p>
+          <a:p>
+            <a:pPr marL="171450" indent="-171450">
+              <a:buFontTx/>
+              <a:buChar char="-"/>
+            </a:pPr>
+            <a:r>
+              <a:rPr lang="en-US" dirty="0"/>
+              <a:t>the anonymous method declaration</a:t>
+            </a:r>
+          </a:p>
+          <a:p>
+            <a:endParaRPr lang="en-US" dirty="0"/>
+          </a:p>
+          <a:p>
+            <a:r>
+              <a:rPr lang="en-US" dirty="0"/>
+              <a:t>Method references can reference free functions, regular methods and anonymous methods.</a:t>
+            </a:r>
+          </a:p>
+          <a:p>
+            <a:endParaRPr lang="en-US" dirty="0"/>
+          </a:p>
+          <a:p>
+            <a:r>
+              <a:rPr lang="en-US" dirty="0"/>
+              <a:t>Function parameters are captured as if they were regular local variables.</a:t>
+            </a:r>
           </a:p>
         </p:txBody>
       </p:sp>
@@ -5179,7 +6584,7 @@
           <a:p>
             <a:fld id="{5DB155C7-787B-4005-9B48-59EDEA8A8FE0}" type="slidenum">
               <a:rPr lang="nb-NO" smtClean="0"/>
-              <a:t>11</a:t>
+              <a:t>8</a:t>
             </a:fld>
             <a:endParaRPr lang="nb-NO"/>
           </a:p>
@@ -5188,7 +6593,7 @@
     </p:spTree>
     <p:extLst>
       <p:ext uri="{BB962C8B-B14F-4D97-AF65-F5344CB8AC3E}">
-        <p14:creationId xmlns:p14="http://schemas.microsoft.com/office/powerpoint/2010/main" val="2006123665"/>
+        <p14:creationId xmlns:p14="http://schemas.microsoft.com/office/powerpoint/2010/main" val="3173072931"/>
       </p:ext>
     </p:extLst>
   </p:cSld>
@@ -5242,26 +6647,26 @@
           <a:bodyPr/>
           <a:lstStyle/>
           <a:p>
-            <a:pPr marL="0" marR="0" lvl="0" indent="0" algn="l" defTabSz="914400" rtl="0" eaLnBrk="1" fontAlgn="auto" latinLnBrk="0" hangingPunct="1">
-              <a:lnSpc>
-                <a:spcPct val="100000"/>
-              </a:lnSpc>
-              <a:spcBef>
-                <a:spcPts val="0"/>
-              </a:spcBef>
-              <a:spcAft>
-                <a:spcPts val="0"/>
-              </a:spcAft>
-              <a:buClrTx/>
-              <a:buSzTx/>
-              <a:buFontTx/>
-              <a:buNone/>
-              <a:tabLst/>
-              <a:defRPr/>
-            </a:pPr>
             <a:r>
               <a:rPr lang="en-US" dirty="0"/>
-              <a:t>Defining an interface with an Invoke method with the correct signature allows one to assign an instance of that interface to a method reference variable.</a:t>
+              <a:t>Anonymous methods are reference counted, which can cause lifetime management issues if it captures reference counted resources.</a:t>
+            </a:r>
+          </a:p>
+          <a:p>
+            <a:endParaRPr lang="en-US" dirty="0"/>
+          </a:p>
+          <a:p>
+            <a:r>
+              <a:rPr lang="en-US" dirty="0"/>
+              <a:t>In the example, </a:t>
+            </a:r>
+            <a:r>
+              <a:rPr lang="en-US" dirty="0" err="1"/>
+              <a:t>i</a:t>
+            </a:r>
+            <a:r>
+              <a:rPr lang="en-US" dirty="0"/>
+              <a:t> is captured and stored as a member of the object implementing the anonymous method.</a:t>
             </a:r>
           </a:p>
         </p:txBody>
@@ -5283,7 +6688,7 @@
           <a:p>
             <a:fld id="{5DB155C7-787B-4005-9B48-59EDEA8A8FE0}" type="slidenum">
               <a:rPr lang="nb-NO" smtClean="0"/>
-              <a:t>12</a:t>
+              <a:t>9</a:t>
             </a:fld>
             <a:endParaRPr lang="nb-NO"/>
           </a:p>
@@ -5292,7 +6697,7 @@
     </p:spTree>
     <p:extLst>
       <p:ext uri="{BB962C8B-B14F-4D97-AF65-F5344CB8AC3E}">
-        <p14:creationId xmlns:p14="http://schemas.microsoft.com/office/powerpoint/2010/main" val="2525782143"/>
+        <p14:creationId xmlns:p14="http://schemas.microsoft.com/office/powerpoint/2010/main" val="2887672922"/>
       </p:ext>
     </p:extLst>
   </p:cSld>
@@ -21155,7 +22560,10 @@
               <a:t>Possible to use </a:t>
             </a:r>
             <a:r>
-              <a:rPr lang="en-US" dirty="0" err="1"/>
+              <a:rPr lang="en-US" dirty="0" err="1">
+                <a:latin typeface="Consolas" panose="020B0609020204030204" pitchFamily="49" charset="0"/>
+                <a:cs typeface="Consolas" panose="020B0609020204030204" pitchFamily="49" charset="0"/>
+              </a:rPr>
               <a:t>var</a:t>
             </a:r>
             <a:r>
@@ -24687,7 +26095,7 @@
             </a:r>
             <a:r>
               <a:rPr lang="nb-NO" dirty="0">
-                <a:hlinkClick r:id="rId2"/>
+                <a:hlinkClick r:id="rId3"/>
               </a:rPr>
               <a:t>https://github.com/aheid/RediscoveringDelphiTalk</a:t>
             </a:r>

</xml_diff>

<commit_message>
Expanded explanation of overloading tag dispatching
</commit_message>
<xml_diff>
--- a/Rediscovering Delphi.pptx
+++ b/Rediscovering Delphi.pptx
@@ -186,7 +186,7 @@
   <pc:docChgLst>
     <pc:chgData name="Asbjørn Heid" userId="2ebb1e453379bdcd" providerId="LiveId" clId="{BF04FEC1-31EF-4AF0-817C-FE2CD974B477}"/>
     <pc:docChg chg="undo custSel addSld modSld">
-      <pc:chgData name="Asbjørn Heid" userId="2ebb1e453379bdcd" providerId="LiveId" clId="{BF04FEC1-31EF-4AF0-817C-FE2CD974B477}" dt="2017-11-09T20:33:57.825" v="1667" actId="20577"/>
+      <pc:chgData name="Asbjørn Heid" userId="2ebb1e453379bdcd" providerId="LiveId" clId="{BF04FEC1-31EF-4AF0-817C-FE2CD974B477}" dt="2017-11-11T22:55:25.293" v="3176" actId="20577"/>
       <pc:docMkLst>
         <pc:docMk/>
       </pc:docMkLst>
@@ -227,7 +227,7 @@
         </pc:sldMkLst>
       </pc:sldChg>
       <pc:sldChg chg="modNotesTx">
-        <pc:chgData name="Asbjørn Heid" userId="2ebb1e453379bdcd" providerId="LiveId" clId="{BF04FEC1-31EF-4AF0-817C-FE2CD974B477}" dt="2017-11-09T19:42:38.941" v="490" actId="20577"/>
+        <pc:chgData name="Asbjørn Heid" userId="2ebb1e453379bdcd" providerId="LiveId" clId="{BF04FEC1-31EF-4AF0-817C-FE2CD974B477}" dt="2017-11-11T22:54:57.906" v="3160" actId="20577"/>
         <pc:sldMkLst>
           <pc:docMk/>
           <pc:sldMk cId="1095182993" sldId="279"/>
@@ -249,7 +249,7 @@
         </pc:spChg>
       </pc:sldChg>
       <pc:sldChg chg="modNotesTx">
-        <pc:chgData name="Asbjørn Heid" userId="2ebb1e453379bdcd" providerId="LiveId" clId="{BF04FEC1-31EF-4AF0-817C-FE2CD974B477}" dt="2017-11-09T20:27:53.059" v="833" actId="20577"/>
+        <pc:chgData name="Asbjørn Heid" userId="2ebb1e453379bdcd" providerId="LiveId" clId="{BF04FEC1-31EF-4AF0-817C-FE2CD974B477}" dt="2017-11-11T22:55:25.293" v="3176" actId="20577"/>
         <pc:sldMkLst>
           <pc:docMk/>
           <pc:sldMk cId="2540353576" sldId="288"/>
@@ -1513,7 +1513,7 @@
           <a:p>
             <a:fld id="{3D379476-BEE1-4BB0-BF4A-3E13C588DAC6}" type="datetimeFigureOut">
               <a:rPr lang="nb-NO" smtClean="0"/>
-              <a:t>09.11.2017</a:t>
+              <a:t>11.11.2017</a:t>
             </a:fld>
             <a:endParaRPr lang="nb-NO"/>
           </a:p>
@@ -4398,15 +4398,160 @@
           <a:p>
             <a:r>
               <a:rPr lang="nb-NO" dirty="0"/>
-              <a:t>No </a:t>
+              <a:t>So </a:t>
             </a:r>
             <a:r>
               <a:rPr lang="nb-NO" dirty="0" err="1"/>
-              <a:t>magic</a:t>
+              <a:t>there’s</a:t>
             </a:r>
             <a:r>
               <a:rPr lang="nb-NO" dirty="0"/>
-              <a:t>, Bind&lt;&gt; is just </a:t>
+              <a:t> </a:t>
+            </a:r>
+            <a:r>
+              <a:rPr lang="nb-NO" dirty="0" err="1"/>
+              <a:t>two</a:t>
+            </a:r>
+            <a:r>
+              <a:rPr lang="nb-NO" dirty="0"/>
+              <a:t> </a:t>
+            </a:r>
+            <a:r>
+              <a:rPr lang="nb-NO" dirty="0" err="1"/>
+              <a:t>orthogonal</a:t>
+            </a:r>
+            <a:r>
+              <a:rPr lang="nb-NO" dirty="0"/>
+              <a:t> </a:t>
+            </a:r>
+            <a:r>
+              <a:rPr lang="nb-NO" dirty="0" err="1"/>
+              <a:t>concepts</a:t>
+            </a:r>
+            <a:r>
+              <a:rPr lang="nb-NO" dirty="0"/>
+              <a:t> </a:t>
+            </a:r>
+            <a:r>
+              <a:rPr lang="nb-NO" dirty="0" err="1"/>
+              <a:t>going</a:t>
+            </a:r>
+            <a:r>
+              <a:rPr lang="nb-NO" dirty="0"/>
+              <a:t> </a:t>
+            </a:r>
+            <a:r>
+              <a:rPr lang="nb-NO" dirty="0" err="1"/>
+              <a:t>on</a:t>
+            </a:r>
+            <a:r>
+              <a:rPr lang="nb-NO" dirty="0"/>
+              <a:t> </a:t>
+            </a:r>
+            <a:r>
+              <a:rPr lang="nb-NO" dirty="0" err="1"/>
+              <a:t>here</a:t>
+            </a:r>
+            <a:r>
+              <a:rPr lang="nb-NO" dirty="0"/>
+              <a:t>: </a:t>
+            </a:r>
+            <a:r>
+              <a:rPr lang="nb-NO" dirty="0" err="1"/>
+              <a:t>the</a:t>
+            </a:r>
+            <a:r>
+              <a:rPr lang="nb-NO" dirty="0"/>
+              <a:t> </a:t>
+            </a:r>
+            <a:r>
+              <a:rPr lang="nb-NO" dirty="0" err="1"/>
+              <a:t>function</a:t>
+            </a:r>
+            <a:r>
+              <a:rPr lang="nb-NO" dirty="0"/>
+              <a:t> generators, and </a:t>
+            </a:r>
+            <a:r>
+              <a:rPr lang="nb-NO" dirty="0" err="1"/>
+              <a:t>the</a:t>
+            </a:r>
+            <a:r>
+              <a:rPr lang="nb-NO" dirty="0"/>
+              <a:t> tag </a:t>
+            </a:r>
+            <a:r>
+              <a:rPr lang="nb-NO" dirty="0" err="1"/>
+              <a:t>dispatching</a:t>
+            </a:r>
+            <a:r>
+              <a:rPr lang="nb-NO" dirty="0"/>
+              <a:t>. The </a:t>
+            </a:r>
+            <a:r>
+              <a:rPr lang="nb-NO" dirty="0" err="1"/>
+              <a:t>function</a:t>
+            </a:r>
+            <a:r>
+              <a:rPr lang="nb-NO" dirty="0"/>
+              <a:t> generators is just used </a:t>
+            </a:r>
+            <a:r>
+              <a:rPr lang="nb-NO" dirty="0" err="1"/>
+              <a:t>here</a:t>
+            </a:r>
+            <a:r>
+              <a:rPr lang="nb-NO" dirty="0"/>
+              <a:t> to </a:t>
+            </a:r>
+            <a:r>
+              <a:rPr lang="nb-NO" dirty="0" err="1"/>
+              <a:t>highlight</a:t>
+            </a:r>
+            <a:r>
+              <a:rPr lang="nb-NO" dirty="0"/>
+              <a:t> </a:t>
+            </a:r>
+            <a:r>
+              <a:rPr lang="nb-NO" dirty="0" err="1"/>
+              <a:t>the</a:t>
+            </a:r>
+            <a:r>
+              <a:rPr lang="nb-NO" dirty="0"/>
+              <a:t> tag </a:t>
+            </a:r>
+            <a:r>
+              <a:rPr lang="nb-NO" dirty="0" err="1"/>
+              <a:t>dispatching</a:t>
+            </a:r>
+            <a:r>
+              <a:rPr lang="nb-NO" dirty="0"/>
+              <a:t> </a:t>
+            </a:r>
+            <a:r>
+              <a:rPr lang="nb-NO" dirty="0" err="1"/>
+              <a:t>technique</a:t>
+            </a:r>
+            <a:r>
+              <a:rPr lang="nb-NO" dirty="0"/>
+              <a:t>.</a:t>
+            </a:r>
+          </a:p>
+          <a:p>
+            <a:endParaRPr lang="nb-NO" dirty="0"/>
+          </a:p>
+          <a:p>
+            <a:r>
+              <a:rPr lang="nb-NO" dirty="0"/>
+              <a:t>Bind&lt;&gt; is just a generator </a:t>
+            </a:r>
+            <a:r>
+              <a:rPr lang="nb-NO" dirty="0" err="1"/>
+              <a:t>of</a:t>
+            </a:r>
+            <a:r>
+              <a:rPr lang="nb-NO" dirty="0"/>
+              <a:t> </a:t>
             </a:r>
             <a:r>
               <a:rPr lang="nb-NO" dirty="0" err="1"/>
@@ -4414,8 +4559,488 @@
             </a:r>
             <a:r>
               <a:rPr lang="nb-NO" dirty="0"/>
+              <a:t> </a:t>
+            </a:r>
+            <a:r>
+              <a:rPr lang="nb-NO" dirty="0" err="1"/>
+              <a:t>functions</a:t>
+            </a:r>
+            <a:r>
+              <a:rPr lang="nb-NO" dirty="0"/>
+              <a:t>, </a:t>
+            </a:r>
+            <a:r>
+              <a:rPr lang="nb-NO" dirty="0" err="1"/>
+              <a:t>which</a:t>
+            </a:r>
+            <a:r>
+              <a:rPr lang="nb-NO" dirty="0"/>
+              <a:t> </a:t>
+            </a:r>
+            <a:r>
+              <a:rPr lang="nb-NO" dirty="0" err="1"/>
+              <a:t>takes</a:t>
+            </a:r>
+            <a:r>
+              <a:rPr lang="nb-NO" dirty="0"/>
+              <a:t> a </a:t>
+            </a:r>
+            <a:r>
+              <a:rPr lang="nb-NO" dirty="0" err="1"/>
+              <a:t>function</a:t>
+            </a:r>
+            <a:r>
+              <a:rPr lang="nb-NO" dirty="0"/>
+              <a:t> an </a:t>
+            </a:r>
+            <a:r>
+              <a:rPr lang="nb-NO" dirty="0" err="1"/>
+              <a:t>fixes</a:t>
+            </a:r>
+            <a:r>
+              <a:rPr lang="nb-NO" dirty="0"/>
+              <a:t> (binds) </a:t>
+            </a:r>
+            <a:r>
+              <a:rPr lang="nb-NO" dirty="0" err="1"/>
+              <a:t>one</a:t>
+            </a:r>
+            <a:r>
+              <a:rPr lang="nb-NO" dirty="0"/>
+              <a:t> or more arguments, and/or </a:t>
+            </a:r>
+            <a:r>
+              <a:rPr lang="nb-NO" dirty="0" err="1"/>
+              <a:t>reorders</a:t>
+            </a:r>
+            <a:r>
+              <a:rPr lang="nb-NO" dirty="0"/>
+              <a:t> </a:t>
+            </a:r>
+            <a:r>
+              <a:rPr lang="nb-NO" dirty="0" err="1"/>
+              <a:t>the</a:t>
+            </a:r>
+            <a:r>
+              <a:rPr lang="nb-NO" dirty="0"/>
+              <a:t> arguments.</a:t>
+            </a:r>
+          </a:p>
+          <a:p>
+            <a:endParaRPr lang="nb-NO" dirty="0"/>
+          </a:p>
+          <a:p>
+            <a:r>
+              <a:rPr lang="nb-NO" dirty="0"/>
+              <a:t>A lot </a:t>
+            </a:r>
+            <a:r>
+              <a:rPr lang="nb-NO" dirty="0" err="1"/>
+              <a:t>of</a:t>
+            </a:r>
+            <a:r>
+              <a:rPr lang="nb-NO" dirty="0"/>
+              <a:t> Bind&lt;&gt; variants </a:t>
+            </a:r>
+            <a:r>
+              <a:rPr lang="nb-NO" dirty="0" err="1"/>
+              <a:t>are</a:t>
+            </a:r>
+            <a:r>
+              <a:rPr lang="nb-NO" dirty="0"/>
+              <a:t> </a:t>
+            </a:r>
+            <a:r>
+              <a:rPr lang="nb-NO" dirty="0" err="1"/>
+              <a:t>needed</a:t>
+            </a:r>
+            <a:r>
+              <a:rPr lang="nb-NO" dirty="0"/>
+              <a:t> in order to be </a:t>
+            </a:r>
+            <a:r>
+              <a:rPr lang="nb-NO" dirty="0" err="1"/>
+              <a:t>able</a:t>
+            </a:r>
+            <a:r>
+              <a:rPr lang="nb-NO" dirty="0"/>
+              <a:t> to bind </a:t>
+            </a:r>
+            <a:r>
+              <a:rPr lang="nb-NO" dirty="0" err="1"/>
+              <a:t>the</a:t>
+            </a:r>
+            <a:r>
+              <a:rPr lang="nb-NO" dirty="0"/>
+              <a:t> </a:t>
+            </a:r>
+            <a:r>
+              <a:rPr lang="nb-NO" dirty="0" err="1"/>
+              <a:t>various</a:t>
+            </a:r>
+            <a:r>
+              <a:rPr lang="nb-NO" dirty="0"/>
+              <a:t> </a:t>
+            </a:r>
+            <a:r>
+              <a:rPr lang="nb-NO" dirty="0" err="1"/>
+              <a:t>possible</a:t>
+            </a:r>
+            <a:r>
+              <a:rPr lang="nb-NO" dirty="0"/>
+              <a:t> argument </a:t>
+            </a:r>
+            <a:r>
+              <a:rPr lang="nb-NO" dirty="0" err="1"/>
+              <a:t>fixing</a:t>
+            </a:r>
+            <a:r>
+              <a:rPr lang="nb-NO" dirty="0"/>
+              <a:t> combinations. </a:t>
+            </a:r>
+            <a:r>
+              <a:rPr lang="nb-NO" dirty="0" err="1"/>
+              <a:t>We</a:t>
+            </a:r>
+            <a:r>
+              <a:rPr lang="nb-NO" dirty="0"/>
+              <a:t> </a:t>
+            </a:r>
+            <a:r>
+              <a:rPr lang="nb-NO" dirty="0" err="1"/>
+              <a:t>can</a:t>
+            </a:r>
+            <a:r>
+              <a:rPr lang="nb-NO" dirty="0"/>
+              <a:t> </a:t>
+            </a:r>
+            <a:r>
+              <a:rPr lang="nb-NO" dirty="0" err="1"/>
+              <a:t>use</a:t>
+            </a:r>
+            <a:r>
+              <a:rPr lang="nb-NO" dirty="0"/>
+              <a:t> operator </a:t>
+            </a:r>
+            <a:r>
+              <a:rPr lang="nb-NO" dirty="0" err="1"/>
+              <a:t>overloading</a:t>
+            </a:r>
+            <a:r>
+              <a:rPr lang="nb-NO" dirty="0"/>
+              <a:t> to </a:t>
+            </a:r>
+            <a:r>
+              <a:rPr lang="nb-NO" dirty="0" err="1"/>
+              <a:t>implement</a:t>
+            </a:r>
+            <a:r>
+              <a:rPr lang="nb-NO" dirty="0"/>
+              <a:t> </a:t>
+            </a:r>
+            <a:r>
+              <a:rPr lang="nb-NO" dirty="0" err="1"/>
+              <a:t>them</a:t>
+            </a:r>
+            <a:r>
+              <a:rPr lang="nb-NO" dirty="0"/>
+              <a:t> all </a:t>
+            </a:r>
+            <a:r>
+              <a:rPr lang="nb-NO" dirty="0" err="1"/>
+              <a:t>with</a:t>
+            </a:r>
+            <a:r>
+              <a:rPr lang="nb-NO" dirty="0"/>
+              <a:t> </a:t>
+            </a:r>
+            <a:r>
+              <a:rPr lang="nb-NO" dirty="0" err="1"/>
+              <a:t>the</a:t>
+            </a:r>
+            <a:r>
+              <a:rPr lang="nb-NO" dirty="0"/>
+              <a:t> same </a:t>
+            </a:r>
+            <a:r>
+              <a:rPr lang="nb-NO" dirty="0" err="1"/>
+              <a:t>name</a:t>
+            </a:r>
+            <a:r>
+              <a:rPr lang="nb-NO" dirty="0"/>
+              <a:t>. The tag </a:t>
+            </a:r>
+            <a:r>
+              <a:rPr lang="nb-NO" dirty="0" err="1"/>
+              <a:t>dispatching</a:t>
+            </a:r>
+            <a:r>
+              <a:rPr lang="nb-NO" dirty="0"/>
+              <a:t> is used to </a:t>
+            </a:r>
+            <a:r>
+              <a:rPr lang="nb-NO" dirty="0" err="1"/>
+              <a:t>select</a:t>
+            </a:r>
+            <a:r>
+              <a:rPr lang="nb-NO" dirty="0"/>
+              <a:t> </a:t>
+            </a:r>
+            <a:r>
+              <a:rPr lang="nb-NO" dirty="0" err="1"/>
+              <a:t>the</a:t>
+            </a:r>
+            <a:r>
+              <a:rPr lang="nb-NO" dirty="0"/>
+              <a:t> right </a:t>
+            </a:r>
+            <a:r>
+              <a:rPr lang="nb-NO" dirty="0" err="1"/>
+              <a:t>one</a:t>
+            </a:r>
+            <a:r>
+              <a:rPr lang="nb-NO" dirty="0"/>
+              <a:t> in a </a:t>
+            </a:r>
+            <a:r>
+              <a:rPr lang="nb-NO" dirty="0" err="1"/>
+              <a:t>nice</a:t>
+            </a:r>
+            <a:r>
+              <a:rPr lang="nb-NO" dirty="0"/>
+              <a:t> </a:t>
+            </a:r>
+            <a:r>
+              <a:rPr lang="nb-NO" dirty="0" err="1"/>
+              <a:t>way</a:t>
+            </a:r>
+            <a:r>
+              <a:rPr lang="nb-NO" dirty="0"/>
               <a:t>.</a:t>
             </a:r>
+          </a:p>
+          <a:p>
+            <a:endParaRPr lang="nb-NO" dirty="0"/>
+          </a:p>
+          <a:p>
+            <a:r>
+              <a:rPr lang="nb-NO" dirty="0"/>
+              <a:t>In </a:t>
+            </a:r>
+            <a:r>
+              <a:rPr lang="nb-NO" dirty="0" err="1"/>
+              <a:t>this</a:t>
+            </a:r>
+            <a:r>
+              <a:rPr lang="nb-NO" dirty="0"/>
+              <a:t> slide </a:t>
+            </a:r>
+            <a:r>
+              <a:rPr lang="nb-NO" dirty="0" err="1"/>
+              <a:t>we</a:t>
+            </a:r>
+            <a:r>
+              <a:rPr lang="nb-NO" dirty="0"/>
+              <a:t> </a:t>
+            </a:r>
+            <a:r>
+              <a:rPr lang="nb-NO" dirty="0" err="1"/>
+              <a:t>see</a:t>
+            </a:r>
+            <a:r>
+              <a:rPr lang="nb-NO" dirty="0"/>
+              <a:t> a variant </a:t>
+            </a:r>
+            <a:r>
+              <a:rPr lang="nb-NO" dirty="0" err="1"/>
+              <a:t>of</a:t>
+            </a:r>
+            <a:r>
+              <a:rPr lang="nb-NO" dirty="0"/>
+              <a:t> Bind&lt;&gt; </a:t>
+            </a:r>
+            <a:r>
+              <a:rPr lang="nb-NO" dirty="0" err="1"/>
+              <a:t>which</a:t>
+            </a:r>
+            <a:r>
+              <a:rPr lang="nb-NO" dirty="0"/>
+              <a:t> </a:t>
+            </a:r>
+            <a:r>
+              <a:rPr lang="nb-NO" dirty="0" err="1"/>
+              <a:t>fixes</a:t>
+            </a:r>
+            <a:r>
+              <a:rPr lang="nb-NO" dirty="0"/>
+              <a:t> (binds) </a:t>
+            </a:r>
+            <a:r>
+              <a:rPr lang="nb-NO" dirty="0" err="1"/>
+              <a:t>the</a:t>
+            </a:r>
+            <a:r>
+              <a:rPr lang="nb-NO" dirty="0"/>
+              <a:t> </a:t>
+            </a:r>
+            <a:r>
+              <a:rPr lang="nb-NO" dirty="0" err="1"/>
+              <a:t>second</a:t>
+            </a:r>
+            <a:r>
+              <a:rPr lang="nb-NO" dirty="0"/>
+              <a:t> argument to </a:t>
+            </a:r>
+            <a:r>
+              <a:rPr lang="nb-NO" dirty="0" err="1"/>
+              <a:t>function</a:t>
+            </a:r>
+            <a:r>
+              <a:rPr lang="nb-NO" dirty="0"/>
+              <a:t> F, a </a:t>
+            </a:r>
+            <a:r>
+              <a:rPr lang="nb-NO" dirty="0" err="1"/>
+              <a:t>function</a:t>
+            </a:r>
+            <a:r>
+              <a:rPr lang="nb-NO" dirty="0"/>
+              <a:t> taking </a:t>
+            </a:r>
+            <a:r>
+              <a:rPr lang="nb-NO" dirty="0" err="1"/>
+              <a:t>two</a:t>
+            </a:r>
+            <a:r>
+              <a:rPr lang="nb-NO" dirty="0"/>
+              <a:t> parameters </a:t>
+            </a:r>
+            <a:r>
+              <a:rPr lang="nb-NO" dirty="0" err="1"/>
+              <a:t>of</a:t>
+            </a:r>
+            <a:r>
+              <a:rPr lang="nb-NO" dirty="0"/>
+              <a:t> type T1 and T2 </a:t>
+            </a:r>
+            <a:r>
+              <a:rPr lang="nb-NO" dirty="0" err="1"/>
+              <a:t>respectively</a:t>
+            </a:r>
+            <a:r>
+              <a:rPr lang="nb-NO" dirty="0"/>
+              <a:t>, and returning a </a:t>
+            </a:r>
+            <a:r>
+              <a:rPr lang="nb-NO" dirty="0" err="1"/>
+              <a:t>value</a:t>
+            </a:r>
+            <a:r>
+              <a:rPr lang="nb-NO" dirty="0"/>
+              <a:t> </a:t>
+            </a:r>
+            <a:r>
+              <a:rPr lang="nb-NO" dirty="0" err="1"/>
+              <a:t>of</a:t>
+            </a:r>
+            <a:r>
+              <a:rPr lang="nb-NO" dirty="0"/>
+              <a:t> type R. </a:t>
+            </a:r>
+          </a:p>
+          <a:p>
+            <a:endParaRPr lang="nb-NO" dirty="0"/>
+          </a:p>
+          <a:p>
+            <a:r>
+              <a:rPr lang="nb-NO" dirty="0"/>
+              <a:t>By binding </a:t>
+            </a:r>
+            <a:r>
+              <a:rPr lang="nb-NO" dirty="0" err="1"/>
+              <a:t>the</a:t>
+            </a:r>
+            <a:r>
+              <a:rPr lang="nb-NO" dirty="0"/>
+              <a:t> </a:t>
+            </a:r>
+            <a:r>
+              <a:rPr lang="nb-NO" dirty="0" err="1"/>
+              <a:t>second</a:t>
+            </a:r>
+            <a:r>
+              <a:rPr lang="nb-NO" dirty="0"/>
+              <a:t> argument, it turns F </a:t>
+            </a:r>
+            <a:r>
+              <a:rPr lang="nb-NO" dirty="0" err="1"/>
+              <a:t>into</a:t>
+            </a:r>
+            <a:r>
+              <a:rPr lang="nb-NO" dirty="0"/>
+              <a:t> a </a:t>
+            </a:r>
+            <a:r>
+              <a:rPr lang="nb-NO" dirty="0" err="1"/>
+              <a:t>function</a:t>
+            </a:r>
+            <a:r>
+              <a:rPr lang="nb-NO" dirty="0"/>
+              <a:t> </a:t>
+            </a:r>
+            <a:r>
+              <a:rPr lang="nb-NO" dirty="0" err="1"/>
+              <a:t>which</a:t>
+            </a:r>
+            <a:r>
+              <a:rPr lang="nb-NO" dirty="0"/>
+              <a:t> </a:t>
+            </a:r>
+            <a:r>
+              <a:rPr lang="nb-NO" dirty="0" err="1"/>
+              <a:t>takes</a:t>
+            </a:r>
+            <a:r>
+              <a:rPr lang="nb-NO" dirty="0"/>
+              <a:t> a single argument </a:t>
+            </a:r>
+            <a:r>
+              <a:rPr lang="nb-NO" dirty="0" err="1"/>
+              <a:t>of</a:t>
+            </a:r>
+            <a:r>
+              <a:rPr lang="nb-NO" dirty="0"/>
+              <a:t> type T1 and </a:t>
+            </a:r>
+            <a:r>
+              <a:rPr lang="nb-NO" dirty="0" err="1"/>
+              <a:t>returns</a:t>
+            </a:r>
+            <a:r>
+              <a:rPr lang="nb-NO" dirty="0"/>
+              <a:t> a </a:t>
+            </a:r>
+            <a:r>
+              <a:rPr lang="nb-NO" dirty="0" err="1"/>
+              <a:t>value</a:t>
+            </a:r>
+            <a:r>
+              <a:rPr lang="nb-NO" dirty="0"/>
+              <a:t> </a:t>
+            </a:r>
+            <a:r>
+              <a:rPr lang="nb-NO" dirty="0" err="1"/>
+              <a:t>of</a:t>
+            </a:r>
+            <a:r>
+              <a:rPr lang="nb-NO" dirty="0"/>
+              <a:t> </a:t>
+            </a:r>
+            <a:r>
+              <a:rPr lang="nb-NO"/>
+              <a:t>type R.</a:t>
+            </a:r>
+            <a:endParaRPr lang="nb-NO" dirty="0"/>
           </a:p>
         </p:txBody>
       </p:sp>
@@ -4665,7 +5290,63 @@
             </a:r>
             <a:r>
               <a:rPr lang="nb-NO" dirty="0"/>
-              <a:t> argument order etc.</a:t>
+              <a:t> argument order etc. The tag </a:t>
+            </a:r>
+            <a:r>
+              <a:rPr lang="nb-NO" dirty="0" err="1"/>
+              <a:t>dispatching</a:t>
+            </a:r>
+            <a:r>
+              <a:rPr lang="nb-NO" dirty="0"/>
+              <a:t> </a:t>
+            </a:r>
+            <a:r>
+              <a:rPr lang="nb-NO" dirty="0" err="1"/>
+              <a:t>allows</a:t>
+            </a:r>
+            <a:r>
+              <a:rPr lang="nb-NO" dirty="0"/>
+              <a:t> </a:t>
+            </a:r>
+            <a:r>
+              <a:rPr lang="nb-NO" dirty="0" err="1"/>
+              <a:t>the</a:t>
+            </a:r>
+            <a:r>
+              <a:rPr lang="nb-NO" dirty="0"/>
+              <a:t> </a:t>
+            </a:r>
+            <a:r>
+              <a:rPr lang="nb-NO" dirty="0" err="1"/>
+              <a:t>user</a:t>
+            </a:r>
+            <a:r>
+              <a:rPr lang="nb-NO" dirty="0"/>
+              <a:t> to </a:t>
+            </a:r>
+            <a:r>
+              <a:rPr lang="nb-NO" dirty="0" err="1"/>
+              <a:t>select</a:t>
+            </a:r>
+            <a:r>
+              <a:rPr lang="nb-NO" dirty="0"/>
+              <a:t> </a:t>
+            </a:r>
+            <a:r>
+              <a:rPr lang="nb-NO" dirty="0" err="1"/>
+              <a:t>the</a:t>
+            </a:r>
+            <a:r>
+              <a:rPr lang="nb-NO" dirty="0"/>
+              <a:t> right </a:t>
+            </a:r>
+            <a:r>
+              <a:rPr lang="nb-NO" dirty="0" err="1"/>
+              <a:t>overload</a:t>
+            </a:r>
+            <a:r>
+              <a:rPr lang="nb-NO" dirty="0"/>
+              <a:t> in an intuitive manner.</a:t>
             </a:r>
           </a:p>
         </p:txBody>
@@ -6854,7 +7535,7 @@
           <a:p>
             <a:fld id="{1CA25263-C386-43A7-8C41-7BBDE04A24B6}" type="datetime1">
               <a:rPr lang="nb-NO" smtClean="0"/>
-              <a:t>09.11.2017</a:t>
+              <a:t>11.11.2017</a:t>
             </a:fld>
             <a:endParaRPr lang="nb-NO"/>
           </a:p>
@@ -7055,7 +7736,7 @@
           <a:p>
             <a:fld id="{B30F0277-130D-4806-8B24-E42664569AC0}" type="datetime1">
               <a:rPr lang="nb-NO" smtClean="0"/>
-              <a:t>09.11.2017</a:t>
+              <a:t>11.11.2017</a:t>
             </a:fld>
             <a:endParaRPr lang="nb-NO"/>
           </a:p>
@@ -7266,7 +7947,7 @@
           <a:p>
             <a:fld id="{B111BC38-13EA-4CDB-B673-256B2359F06B}" type="datetime1">
               <a:rPr lang="nb-NO" smtClean="0"/>
-              <a:t>09.11.2017</a:t>
+              <a:t>11.11.2017</a:t>
             </a:fld>
             <a:endParaRPr lang="nb-NO"/>
           </a:p>
@@ -7467,7 +8148,7 @@
           <a:p>
             <a:fld id="{BFD4BB09-EFA4-40A7-A90E-AD3A27818E8C}" type="datetime1">
               <a:rPr lang="nb-NO" smtClean="0"/>
-              <a:t>09.11.2017</a:t>
+              <a:t>11.11.2017</a:t>
             </a:fld>
             <a:endParaRPr lang="nb-NO"/>
           </a:p>
@@ -7745,7 +8426,7 @@
           <a:p>
             <a:fld id="{E245260D-2880-4C9E-9907-A8E4E594D310}" type="datetime1">
               <a:rPr lang="nb-NO" smtClean="0"/>
-              <a:t>09.11.2017</a:t>
+              <a:t>11.11.2017</a:t>
             </a:fld>
             <a:endParaRPr lang="nb-NO"/>
           </a:p>
@@ -8013,7 +8694,7 @@
           <a:p>
             <a:fld id="{F2F3831E-3E0E-44A8-B40B-DECCD0900136}" type="datetime1">
               <a:rPr lang="nb-NO" smtClean="0"/>
-              <a:t>09.11.2017</a:t>
+              <a:t>11.11.2017</a:t>
             </a:fld>
             <a:endParaRPr lang="nb-NO"/>
           </a:p>
@@ -8428,7 +9109,7 @@
           <a:p>
             <a:fld id="{B1777683-0599-4471-9D05-37A530AE1D63}" type="datetime1">
               <a:rPr lang="nb-NO" smtClean="0"/>
-              <a:t>09.11.2017</a:t>
+              <a:t>11.11.2017</a:t>
             </a:fld>
             <a:endParaRPr lang="nb-NO"/>
           </a:p>
@@ -8572,7 +9253,7 @@
           <a:p>
             <a:fld id="{04BEDA7E-E460-4F72-9ADA-627E99678122}" type="datetime1">
               <a:rPr lang="nb-NO" smtClean="0"/>
-              <a:t>09.11.2017</a:t>
+              <a:t>11.11.2017</a:t>
             </a:fld>
             <a:endParaRPr lang="nb-NO"/>
           </a:p>
@@ -8688,7 +9369,7 @@
           <a:p>
             <a:fld id="{D963CEF4-B62A-4CDF-8DC5-2EFAA0541EB6}" type="datetime1">
               <a:rPr lang="nb-NO" smtClean="0"/>
-              <a:t>09.11.2017</a:t>
+              <a:t>11.11.2017</a:t>
             </a:fld>
             <a:endParaRPr lang="nb-NO"/>
           </a:p>
@@ -9002,7 +9683,7 @@
           <a:p>
             <a:fld id="{D4467B57-AACB-4E78-95B8-4085A0D6B2E5}" type="datetime1">
               <a:rPr lang="nb-NO" smtClean="0"/>
-              <a:t>09.11.2017</a:t>
+              <a:t>11.11.2017</a:t>
             </a:fld>
             <a:endParaRPr lang="nb-NO"/>
           </a:p>
@@ -9293,7 +9974,7 @@
           <a:p>
             <a:fld id="{947C030E-3F52-4390-8572-363134B63C3B}" type="datetime1">
               <a:rPr lang="nb-NO" smtClean="0"/>
-              <a:t>09.11.2017</a:t>
+              <a:t>11.11.2017</a:t>
             </a:fld>
             <a:endParaRPr lang="nb-NO"/>
           </a:p>
@@ -9537,7 +10218,7 @@
           <a:p>
             <a:fld id="{BEE03C7A-1290-404A-8A18-5BA01691B202}" type="datetime1">
               <a:rPr lang="nb-NO" smtClean="0"/>
-              <a:t>09.11.2017</a:t>
+              <a:t>11.11.2017</a:t>
             </a:fld>
             <a:endParaRPr lang="nb-NO"/>
           </a:p>

</xml_diff>